<commit_message>
Title and overview changes
</commit_message>
<xml_diff>
--- a/Presentation/socialmedia_impact_ppt.pptx
+++ b/Presentation/socialmedia_impact_ppt.pptx
@@ -7,7 +7,7 @@
   <p:sldIdLst>
     <p:sldId id="258" r:id="rId2"/>
     <p:sldId id="257" r:id="rId3"/>
-    <p:sldId id="259" r:id="rId4"/>
+    <p:sldId id="262" r:id="rId4"/>
     <p:sldId id="260" r:id="rId5"/>
     <p:sldId id="261" r:id="rId6"/>
   </p:sldIdLst>
@@ -115,7 +115,7 @@
           <p14:sldIdLst>
             <p14:sldId id="258"/>
             <p14:sldId id="257"/>
-            <p14:sldId id="259"/>
+            <p14:sldId id="262"/>
             <p14:sldId id="260"/>
             <p14:sldId id="261"/>
           </p14:sldIdLst>
@@ -911,788 +911,6 @@
 </dgm:colorsDef>
 </file>
 
-<file path=ppt/diagrams/colors2.xml><?xml version="1.0" encoding="utf-8"?>
-<dgm:colorsDef xmlns:dgm="http://schemas.openxmlformats.org/drawingml/2006/diagram" xmlns:a="http://schemas.openxmlformats.org/drawingml/2006/main" uniqueId="urn:microsoft.com/office/officeart/2005/8/colors/colorful5">
-  <dgm:title val=""/>
-  <dgm:desc val=""/>
-  <dgm:catLst>
-    <dgm:cat type="colorful" pri="10500"/>
-  </dgm:catLst>
-  <dgm:styleLbl name="node0">
-    <dgm:fillClrLst meth="repeat">
-      <a:schemeClr val="accent4"/>
-    </dgm:fillClrLst>
-    <dgm:linClrLst meth="repeat">
-      <a:schemeClr val="lt1"/>
-    </dgm:linClrLst>
-    <dgm:effectClrLst/>
-    <dgm:txLinClrLst/>
-    <dgm:txFillClrLst/>
-    <dgm:txEffectClrLst/>
-  </dgm:styleLbl>
-  <dgm:styleLbl name="node1">
-    <dgm:fillClrLst>
-      <a:schemeClr val="accent5"/>
-      <a:schemeClr val="accent6"/>
-    </dgm:fillClrLst>
-    <dgm:linClrLst meth="repeat">
-      <a:schemeClr val="lt1"/>
-    </dgm:linClrLst>
-    <dgm:effectClrLst/>
-    <dgm:txLinClrLst/>
-    <dgm:txFillClrLst/>
-    <dgm:txEffectClrLst/>
-  </dgm:styleLbl>
-  <dgm:styleLbl name="alignNode1">
-    <dgm:fillClrLst>
-      <a:schemeClr val="accent5"/>
-      <a:schemeClr val="accent6"/>
-    </dgm:fillClrLst>
-    <dgm:linClrLst>
-      <a:schemeClr val="accent5"/>
-      <a:schemeClr val="accent6"/>
-    </dgm:linClrLst>
-    <dgm:effectClrLst/>
-    <dgm:txLinClrLst/>
-    <dgm:txFillClrLst/>
-    <dgm:txEffectClrLst/>
-  </dgm:styleLbl>
-  <dgm:styleLbl name="lnNode1">
-    <dgm:fillClrLst>
-      <a:schemeClr val="accent5"/>
-      <a:schemeClr val="accent6"/>
-    </dgm:fillClrLst>
-    <dgm:linClrLst meth="repeat">
-      <a:schemeClr val="lt1"/>
-    </dgm:linClrLst>
-    <dgm:effectClrLst/>
-    <dgm:txLinClrLst/>
-    <dgm:txFillClrLst/>
-    <dgm:txEffectClrLst/>
-  </dgm:styleLbl>
-  <dgm:styleLbl name="vennNode1">
-    <dgm:fillClrLst>
-      <a:schemeClr val="accent5">
-        <a:alpha val="50000"/>
-      </a:schemeClr>
-      <a:schemeClr val="accent6">
-        <a:alpha val="50000"/>
-      </a:schemeClr>
-    </dgm:fillClrLst>
-    <dgm:linClrLst meth="repeat">
-      <a:schemeClr val="lt1"/>
-    </dgm:linClrLst>
-    <dgm:effectClrLst/>
-    <dgm:txLinClrLst/>
-    <dgm:txFillClrLst/>
-    <dgm:txEffectClrLst/>
-  </dgm:styleLbl>
-  <dgm:styleLbl name="node2">
-    <dgm:fillClrLst>
-      <a:schemeClr val="accent6"/>
-    </dgm:fillClrLst>
-    <dgm:linClrLst meth="repeat">
-      <a:schemeClr val="lt1"/>
-    </dgm:linClrLst>
-    <dgm:effectClrLst/>
-    <dgm:txLinClrLst/>
-    <dgm:txFillClrLst/>
-    <dgm:txEffectClrLst/>
-  </dgm:styleLbl>
-  <dgm:styleLbl name="node3">
-    <dgm:fillClrLst>
-      <a:schemeClr val="accent1"/>
-    </dgm:fillClrLst>
-    <dgm:linClrLst meth="repeat">
-      <a:schemeClr val="lt1"/>
-    </dgm:linClrLst>
-    <dgm:effectClrLst/>
-    <dgm:txLinClrLst/>
-    <dgm:txFillClrLst/>
-    <dgm:txEffectClrLst/>
-  </dgm:styleLbl>
-  <dgm:styleLbl name="node4">
-    <dgm:fillClrLst>
-      <a:schemeClr val="accent2"/>
-    </dgm:fillClrLst>
-    <dgm:linClrLst meth="repeat">
-      <a:schemeClr val="lt1"/>
-    </dgm:linClrLst>
-    <dgm:effectClrLst/>
-    <dgm:txLinClrLst/>
-    <dgm:txFillClrLst/>
-    <dgm:txEffectClrLst/>
-  </dgm:styleLbl>
-  <dgm:styleLbl name="fgImgPlace1">
-    <dgm:fillClrLst>
-      <a:schemeClr val="accent5">
-        <a:tint val="50000"/>
-      </a:schemeClr>
-      <a:schemeClr val="accent6">
-        <a:tint val="50000"/>
-      </a:schemeClr>
-    </dgm:fillClrLst>
-    <dgm:linClrLst meth="repeat">
-      <a:schemeClr val="lt1"/>
-    </dgm:linClrLst>
-    <dgm:effectClrLst/>
-    <dgm:txLinClrLst/>
-    <dgm:txFillClrLst meth="repeat">
-      <a:schemeClr val="lt1"/>
-    </dgm:txFillClrLst>
-    <dgm:txEffectClrLst/>
-  </dgm:styleLbl>
-  <dgm:styleLbl name="alignImgPlace1">
-    <dgm:fillClrLst>
-      <a:schemeClr val="accent5">
-        <a:tint val="50000"/>
-      </a:schemeClr>
-      <a:schemeClr val="accent6">
-        <a:tint val="20000"/>
-      </a:schemeClr>
-    </dgm:fillClrLst>
-    <dgm:linClrLst meth="repeat">
-      <a:schemeClr val="lt1"/>
-    </dgm:linClrLst>
-    <dgm:effectClrLst/>
-    <dgm:txLinClrLst/>
-    <dgm:txFillClrLst meth="repeat">
-      <a:schemeClr val="lt1"/>
-    </dgm:txFillClrLst>
-    <dgm:txEffectClrLst/>
-  </dgm:styleLbl>
-  <dgm:styleLbl name="bgImgPlace1">
-    <dgm:fillClrLst>
-      <a:schemeClr val="accent5">
-        <a:tint val="50000"/>
-      </a:schemeClr>
-      <a:schemeClr val="accent6">
-        <a:tint val="20000"/>
-      </a:schemeClr>
-    </dgm:fillClrLst>
-    <dgm:linClrLst meth="repeat">
-      <a:schemeClr val="lt1"/>
-    </dgm:linClrLst>
-    <dgm:effectClrLst/>
-    <dgm:txLinClrLst/>
-    <dgm:txFillClrLst meth="repeat">
-      <a:schemeClr val="lt1"/>
-    </dgm:txFillClrLst>
-    <dgm:txEffectClrLst/>
-  </dgm:styleLbl>
-  <dgm:styleLbl name="sibTrans2D1">
-    <dgm:fillClrLst>
-      <a:schemeClr val="accent5"/>
-      <a:schemeClr val="accent6"/>
-    </dgm:fillClrLst>
-    <dgm:linClrLst meth="repeat">
-      <a:schemeClr val="lt1"/>
-    </dgm:linClrLst>
-    <dgm:effectClrLst/>
-    <dgm:txLinClrLst/>
-    <dgm:txFillClrLst/>
-    <dgm:txEffectClrLst/>
-  </dgm:styleLbl>
-  <dgm:styleLbl name="fgSibTrans2D1">
-    <dgm:fillClrLst>
-      <a:schemeClr val="accent5"/>
-      <a:schemeClr val="accent6"/>
-    </dgm:fillClrLst>
-    <dgm:linClrLst meth="repeat">
-      <a:schemeClr val="lt1"/>
-    </dgm:linClrLst>
-    <dgm:effectClrLst/>
-    <dgm:txLinClrLst/>
-    <dgm:txFillClrLst meth="repeat">
-      <a:schemeClr val="lt1"/>
-    </dgm:txFillClrLst>
-    <dgm:txEffectClrLst/>
-  </dgm:styleLbl>
-  <dgm:styleLbl name="bgSibTrans2D1">
-    <dgm:fillClrLst>
-      <a:schemeClr val="accent5"/>
-      <a:schemeClr val="accent6"/>
-    </dgm:fillClrLst>
-    <dgm:linClrLst meth="repeat">
-      <a:schemeClr val="lt1"/>
-    </dgm:linClrLst>
-    <dgm:effectClrLst/>
-    <dgm:txLinClrLst/>
-    <dgm:txFillClrLst meth="repeat">
-      <a:schemeClr val="lt1"/>
-    </dgm:txFillClrLst>
-    <dgm:txEffectClrLst/>
-  </dgm:styleLbl>
-  <dgm:styleLbl name="sibTrans1D1">
-    <dgm:fillClrLst/>
-    <dgm:linClrLst>
-      <a:schemeClr val="accent5"/>
-      <a:schemeClr val="accent6"/>
-    </dgm:linClrLst>
-    <dgm:effectClrLst/>
-    <dgm:txLinClrLst/>
-    <dgm:txFillClrLst meth="repeat">
-      <a:schemeClr val="tx1"/>
-    </dgm:txFillClrLst>
-    <dgm:txEffectClrLst/>
-  </dgm:styleLbl>
-  <dgm:styleLbl name="callout">
-    <dgm:fillClrLst meth="repeat">
-      <a:schemeClr val="accent5"/>
-    </dgm:fillClrLst>
-    <dgm:linClrLst meth="repeat">
-      <a:schemeClr val="accent5">
-        <a:tint val="50000"/>
-      </a:schemeClr>
-    </dgm:linClrLst>
-    <dgm:effectClrLst/>
-    <dgm:txLinClrLst/>
-    <dgm:txFillClrLst meth="repeat">
-      <a:schemeClr val="tx1"/>
-    </dgm:txFillClrLst>
-    <dgm:txEffectClrLst/>
-  </dgm:styleLbl>
-  <dgm:styleLbl name="asst0">
-    <dgm:fillClrLst meth="repeat">
-      <a:schemeClr val="accent5"/>
-    </dgm:fillClrLst>
-    <dgm:linClrLst meth="repeat">
-      <a:schemeClr val="lt1">
-        <a:shade val="80000"/>
-      </a:schemeClr>
-    </dgm:linClrLst>
-    <dgm:effectClrLst/>
-    <dgm:txLinClrLst/>
-    <dgm:txFillClrLst/>
-    <dgm:txEffectClrLst/>
-  </dgm:styleLbl>
-  <dgm:styleLbl name="asst1">
-    <dgm:fillClrLst meth="repeat">
-      <a:schemeClr val="accent6"/>
-    </dgm:fillClrLst>
-    <dgm:linClrLst meth="repeat">
-      <a:schemeClr val="lt1">
-        <a:shade val="80000"/>
-      </a:schemeClr>
-    </dgm:linClrLst>
-    <dgm:effectClrLst/>
-    <dgm:txLinClrLst/>
-    <dgm:txFillClrLst/>
-    <dgm:txEffectClrLst/>
-  </dgm:styleLbl>
-  <dgm:styleLbl name="asst2">
-    <dgm:fillClrLst>
-      <a:schemeClr val="accent1"/>
-    </dgm:fillClrLst>
-    <dgm:linClrLst meth="repeat">
-      <a:schemeClr val="lt1"/>
-    </dgm:linClrLst>
-    <dgm:effectClrLst/>
-    <dgm:txLinClrLst/>
-    <dgm:txFillClrLst/>
-    <dgm:txEffectClrLst/>
-  </dgm:styleLbl>
-  <dgm:styleLbl name="asst3">
-    <dgm:fillClrLst>
-      <a:schemeClr val="accent2"/>
-    </dgm:fillClrLst>
-    <dgm:linClrLst meth="repeat">
-      <a:schemeClr val="lt1"/>
-    </dgm:linClrLst>
-    <dgm:effectClrLst/>
-    <dgm:txLinClrLst/>
-    <dgm:txFillClrLst/>
-    <dgm:txEffectClrLst/>
-  </dgm:styleLbl>
-  <dgm:styleLbl name="asst4">
-    <dgm:fillClrLst>
-      <a:schemeClr val="accent3"/>
-    </dgm:fillClrLst>
-    <dgm:linClrLst meth="repeat">
-      <a:schemeClr val="lt1"/>
-    </dgm:linClrLst>
-    <dgm:effectClrLst/>
-    <dgm:txLinClrLst/>
-    <dgm:txFillClrLst/>
-    <dgm:txEffectClrLst/>
-  </dgm:styleLbl>
-  <dgm:styleLbl name="parChTrans2D1">
-    <dgm:fillClrLst meth="repeat">
-      <a:schemeClr val="accent5"/>
-    </dgm:fillClrLst>
-    <dgm:linClrLst meth="repeat">
-      <a:schemeClr val="lt1"/>
-    </dgm:linClrLst>
-    <dgm:effectClrLst/>
-    <dgm:txLinClrLst/>
-    <dgm:txFillClrLst meth="repeat">
-      <a:schemeClr val="lt1"/>
-    </dgm:txFillClrLst>
-    <dgm:txEffectClrLst/>
-  </dgm:styleLbl>
-  <dgm:styleLbl name="parChTrans2D2">
-    <dgm:fillClrLst meth="repeat">
-      <a:schemeClr val="accent6"/>
-    </dgm:fillClrLst>
-    <dgm:linClrLst meth="repeat">
-      <a:schemeClr val="lt1"/>
-    </dgm:linClrLst>
-    <dgm:effectClrLst/>
-    <dgm:txLinClrLst/>
-    <dgm:txFillClrLst/>
-    <dgm:txEffectClrLst/>
-  </dgm:styleLbl>
-  <dgm:styleLbl name="parChTrans2D3">
-    <dgm:fillClrLst meth="repeat">
-      <a:schemeClr val="accent6"/>
-    </dgm:fillClrLst>
-    <dgm:linClrLst meth="repeat">
-      <a:schemeClr val="lt1"/>
-    </dgm:linClrLst>
-    <dgm:effectClrLst/>
-    <dgm:txLinClrLst/>
-    <dgm:txFillClrLst/>
-    <dgm:txEffectClrLst/>
-  </dgm:styleLbl>
-  <dgm:styleLbl name="parChTrans2D4">
-    <dgm:fillClrLst meth="repeat">
-      <a:schemeClr val="accent1"/>
-    </dgm:fillClrLst>
-    <dgm:linClrLst meth="repeat">
-      <a:schemeClr val="lt1"/>
-    </dgm:linClrLst>
-    <dgm:effectClrLst/>
-    <dgm:txLinClrLst/>
-    <dgm:txFillClrLst meth="repeat">
-      <a:schemeClr val="lt1"/>
-    </dgm:txFillClrLst>
-    <dgm:txEffectClrLst/>
-  </dgm:styleLbl>
-  <dgm:styleLbl name="parChTrans1D1">
-    <dgm:fillClrLst meth="repeat">
-      <a:schemeClr val="accent5"/>
-    </dgm:fillClrLst>
-    <dgm:linClrLst meth="repeat">
-      <a:schemeClr val="accent5"/>
-    </dgm:linClrLst>
-    <dgm:effectClrLst/>
-    <dgm:txLinClrLst/>
-    <dgm:txFillClrLst meth="repeat">
-      <a:schemeClr val="tx1"/>
-    </dgm:txFillClrLst>
-    <dgm:txEffectClrLst/>
-  </dgm:styleLbl>
-  <dgm:styleLbl name="parChTrans1D2">
-    <dgm:fillClrLst meth="repeat">
-      <a:schemeClr val="accent6">
-        <a:tint val="90000"/>
-      </a:schemeClr>
-    </dgm:fillClrLst>
-    <dgm:linClrLst meth="repeat">
-      <a:schemeClr val="accent6"/>
-    </dgm:linClrLst>
-    <dgm:effectClrLst/>
-    <dgm:txLinClrLst/>
-    <dgm:txFillClrLst meth="repeat">
-      <a:schemeClr val="tx1"/>
-    </dgm:txFillClrLst>
-    <dgm:txEffectClrLst/>
-  </dgm:styleLbl>
-  <dgm:styleLbl name="parChTrans1D3">
-    <dgm:fillClrLst meth="repeat">
-      <a:schemeClr val="accent6">
-        <a:tint val="70000"/>
-      </a:schemeClr>
-    </dgm:fillClrLst>
-    <dgm:linClrLst meth="repeat">
-      <a:schemeClr val="accent1"/>
-    </dgm:linClrLst>
-    <dgm:effectClrLst/>
-    <dgm:txLinClrLst/>
-    <dgm:txFillClrLst meth="repeat">
-      <a:schemeClr val="tx1"/>
-    </dgm:txFillClrLst>
-    <dgm:txEffectClrLst/>
-  </dgm:styleLbl>
-  <dgm:styleLbl name="parChTrans1D4">
-    <dgm:fillClrLst meth="repeat">
-      <a:schemeClr val="accent6">
-        <a:tint val="50000"/>
-      </a:schemeClr>
-    </dgm:fillClrLst>
-    <dgm:linClrLst meth="repeat">
-      <a:schemeClr val="accent2"/>
-    </dgm:linClrLst>
-    <dgm:effectClrLst/>
-    <dgm:txLinClrLst/>
-    <dgm:txFillClrLst meth="repeat">
-      <a:schemeClr val="tx1"/>
-    </dgm:txFillClrLst>
-    <dgm:txEffectClrLst/>
-  </dgm:styleLbl>
-  <dgm:styleLbl name="fgAcc1">
-    <dgm:fillClrLst meth="repeat">
-      <a:schemeClr val="lt1">
-        <a:alpha val="90000"/>
-      </a:schemeClr>
-    </dgm:fillClrLst>
-    <dgm:linClrLst>
-      <a:schemeClr val="accent5"/>
-      <a:schemeClr val="accent6"/>
-    </dgm:linClrLst>
-    <dgm:effectClrLst/>
-    <dgm:txLinClrLst/>
-    <dgm:txFillClrLst meth="repeat">
-      <a:schemeClr val="dk1"/>
-    </dgm:txFillClrLst>
-    <dgm:txEffectClrLst/>
-  </dgm:styleLbl>
-  <dgm:styleLbl name="conFgAcc1">
-    <dgm:fillClrLst meth="repeat">
-      <a:schemeClr val="lt1">
-        <a:alpha val="90000"/>
-      </a:schemeClr>
-    </dgm:fillClrLst>
-    <dgm:linClrLst>
-      <a:schemeClr val="accent5"/>
-      <a:schemeClr val="accent6"/>
-    </dgm:linClrLst>
-    <dgm:effectClrLst/>
-    <dgm:txLinClrLst/>
-    <dgm:txFillClrLst meth="repeat">
-      <a:schemeClr val="dk1"/>
-    </dgm:txFillClrLst>
-    <dgm:txEffectClrLst/>
-  </dgm:styleLbl>
-  <dgm:styleLbl name="alignAcc1">
-    <dgm:fillClrLst meth="repeat">
-      <a:schemeClr val="lt1">
-        <a:alpha val="90000"/>
-      </a:schemeClr>
-    </dgm:fillClrLst>
-    <dgm:linClrLst>
-      <a:schemeClr val="accent5"/>
-      <a:schemeClr val="accent6"/>
-    </dgm:linClrLst>
-    <dgm:effectClrLst/>
-    <dgm:txLinClrLst/>
-    <dgm:txFillClrLst meth="repeat">
-      <a:schemeClr val="dk1"/>
-    </dgm:txFillClrLst>
-    <dgm:txEffectClrLst/>
-  </dgm:styleLbl>
-  <dgm:styleLbl name="trAlignAcc1">
-    <dgm:fillClrLst meth="repeat">
-      <a:schemeClr val="lt1">
-        <a:alpha val="40000"/>
-      </a:schemeClr>
-    </dgm:fillClrLst>
-    <dgm:linClrLst meth="repeat">
-      <a:schemeClr val="accent5"/>
-    </dgm:linClrLst>
-    <dgm:effectClrLst/>
-    <dgm:txLinClrLst/>
-    <dgm:txFillClrLst meth="repeat">
-      <a:schemeClr val="dk1"/>
-    </dgm:txFillClrLst>
-    <dgm:txEffectClrLst/>
-  </dgm:styleLbl>
-  <dgm:styleLbl name="bgAcc1">
-    <dgm:fillClrLst meth="repeat">
-      <a:schemeClr val="lt1">
-        <a:alpha val="90000"/>
-      </a:schemeClr>
-    </dgm:fillClrLst>
-    <dgm:linClrLst>
-      <a:schemeClr val="accent5"/>
-      <a:schemeClr val="accent6"/>
-    </dgm:linClrLst>
-    <dgm:effectClrLst/>
-    <dgm:txLinClrLst/>
-    <dgm:txFillClrLst meth="repeat">
-      <a:schemeClr val="dk1"/>
-    </dgm:txFillClrLst>
-    <dgm:txEffectClrLst/>
-  </dgm:styleLbl>
-  <dgm:styleLbl name="solidFgAcc1">
-    <dgm:fillClrLst meth="repeat">
-      <a:schemeClr val="lt1"/>
-    </dgm:fillClrLst>
-    <dgm:linClrLst>
-      <a:schemeClr val="accent5"/>
-      <a:schemeClr val="accent6"/>
-    </dgm:linClrLst>
-    <dgm:effectClrLst/>
-    <dgm:txLinClrLst/>
-    <dgm:txFillClrLst meth="repeat">
-      <a:schemeClr val="dk1"/>
-    </dgm:txFillClrLst>
-    <dgm:txEffectClrLst/>
-  </dgm:styleLbl>
-  <dgm:styleLbl name="solidAlignAcc1">
-    <dgm:fillClrLst meth="repeat">
-      <a:schemeClr val="lt1"/>
-    </dgm:fillClrLst>
-    <dgm:linClrLst>
-      <a:schemeClr val="accent5"/>
-      <a:schemeClr val="accent6"/>
-    </dgm:linClrLst>
-    <dgm:effectClrLst/>
-    <dgm:txLinClrLst/>
-    <dgm:txFillClrLst meth="repeat">
-      <a:schemeClr val="dk1"/>
-    </dgm:txFillClrLst>
-    <dgm:txEffectClrLst/>
-  </dgm:styleLbl>
-  <dgm:styleLbl name="solidBgAcc1">
-    <dgm:fillClrLst meth="repeat">
-      <a:schemeClr val="lt1"/>
-    </dgm:fillClrLst>
-    <dgm:linClrLst>
-      <a:schemeClr val="accent5"/>
-      <a:schemeClr val="accent6"/>
-    </dgm:linClrLst>
-    <dgm:effectClrLst/>
-    <dgm:txLinClrLst/>
-    <dgm:txFillClrLst meth="repeat">
-      <a:schemeClr val="dk1"/>
-    </dgm:txFillClrLst>
-    <dgm:txEffectClrLst/>
-  </dgm:styleLbl>
-  <dgm:styleLbl name="fgAccFollowNode1">
-    <dgm:fillClrLst>
-      <a:schemeClr val="accent5">
-        <a:tint val="40000"/>
-        <a:alpha val="90000"/>
-      </a:schemeClr>
-      <a:schemeClr val="accent6">
-        <a:tint val="40000"/>
-        <a:alpha val="90000"/>
-      </a:schemeClr>
-    </dgm:fillClrLst>
-    <dgm:linClrLst>
-      <a:schemeClr val="accent5">
-        <a:tint val="40000"/>
-        <a:alpha val="90000"/>
-      </a:schemeClr>
-      <a:schemeClr val="accent5">
-        <a:tint val="40000"/>
-        <a:alpha val="90000"/>
-      </a:schemeClr>
-    </dgm:linClrLst>
-    <dgm:effectClrLst/>
-    <dgm:txLinClrLst/>
-    <dgm:txFillClrLst meth="repeat">
-      <a:schemeClr val="dk1"/>
-    </dgm:txFillClrLst>
-    <dgm:txEffectClrLst/>
-  </dgm:styleLbl>
-  <dgm:styleLbl name="alignAccFollowNode1">
-    <dgm:fillClrLst>
-      <a:schemeClr val="accent5">
-        <a:tint val="40000"/>
-        <a:alpha val="90000"/>
-      </a:schemeClr>
-      <a:schemeClr val="accent6">
-        <a:tint val="40000"/>
-        <a:alpha val="90000"/>
-      </a:schemeClr>
-    </dgm:fillClrLst>
-    <dgm:linClrLst>
-      <a:schemeClr val="accent5">
-        <a:tint val="40000"/>
-        <a:alpha val="90000"/>
-      </a:schemeClr>
-      <a:schemeClr val="accent6">
-        <a:tint val="40000"/>
-        <a:alpha val="90000"/>
-      </a:schemeClr>
-    </dgm:linClrLst>
-    <dgm:effectClrLst/>
-    <dgm:txLinClrLst/>
-    <dgm:txFillClrLst meth="repeat">
-      <a:schemeClr val="dk1"/>
-    </dgm:txFillClrLst>
-    <dgm:txEffectClrLst/>
-  </dgm:styleLbl>
-  <dgm:styleLbl name="bgAccFollowNode1">
-    <dgm:fillClrLst>
-      <a:schemeClr val="accent5">
-        <a:tint val="40000"/>
-        <a:alpha val="90000"/>
-      </a:schemeClr>
-      <a:schemeClr val="accent6">
-        <a:tint val="40000"/>
-        <a:alpha val="90000"/>
-      </a:schemeClr>
-    </dgm:fillClrLst>
-    <dgm:linClrLst>
-      <a:schemeClr val="accent5">
-        <a:tint val="40000"/>
-        <a:alpha val="90000"/>
-      </a:schemeClr>
-      <a:schemeClr val="accent6">
-        <a:tint val="40000"/>
-        <a:alpha val="90000"/>
-      </a:schemeClr>
-    </dgm:linClrLst>
-    <dgm:effectClrLst/>
-    <dgm:txLinClrLst/>
-    <dgm:txFillClrLst meth="repeat">
-      <a:schemeClr val="dk1"/>
-    </dgm:txFillClrLst>
-    <dgm:txEffectClrLst/>
-  </dgm:styleLbl>
-  <dgm:styleLbl name="fgAcc0">
-    <dgm:fillClrLst meth="repeat">
-      <a:schemeClr val="lt1">
-        <a:alpha val="90000"/>
-      </a:schemeClr>
-    </dgm:fillClrLst>
-    <dgm:linClrLst>
-      <a:schemeClr val="accent4"/>
-    </dgm:linClrLst>
-    <dgm:effectClrLst/>
-    <dgm:txLinClrLst/>
-    <dgm:txFillClrLst meth="repeat">
-      <a:schemeClr val="dk1"/>
-    </dgm:txFillClrLst>
-    <dgm:txEffectClrLst/>
-  </dgm:styleLbl>
-  <dgm:styleLbl name="fgAcc2">
-    <dgm:fillClrLst meth="repeat">
-      <a:schemeClr val="lt1">
-        <a:alpha val="90000"/>
-      </a:schemeClr>
-    </dgm:fillClrLst>
-    <dgm:linClrLst>
-      <a:schemeClr val="accent6"/>
-    </dgm:linClrLst>
-    <dgm:effectClrLst/>
-    <dgm:txLinClrLst/>
-    <dgm:txFillClrLst meth="repeat">
-      <a:schemeClr val="dk1"/>
-    </dgm:txFillClrLst>
-    <dgm:txEffectClrLst/>
-  </dgm:styleLbl>
-  <dgm:styleLbl name="fgAcc3">
-    <dgm:fillClrLst meth="repeat">
-      <a:schemeClr val="lt1">
-        <a:alpha val="90000"/>
-      </a:schemeClr>
-    </dgm:fillClrLst>
-    <dgm:linClrLst>
-      <a:schemeClr val="accent1"/>
-    </dgm:linClrLst>
-    <dgm:effectClrLst/>
-    <dgm:txLinClrLst/>
-    <dgm:txFillClrLst meth="repeat">
-      <a:schemeClr val="dk1"/>
-    </dgm:txFillClrLst>
-    <dgm:txEffectClrLst/>
-  </dgm:styleLbl>
-  <dgm:styleLbl name="fgAcc4">
-    <dgm:fillClrLst meth="repeat">
-      <a:schemeClr val="lt1">
-        <a:alpha val="90000"/>
-      </a:schemeClr>
-    </dgm:fillClrLst>
-    <dgm:linClrLst>
-      <a:schemeClr val="accent2"/>
-    </dgm:linClrLst>
-    <dgm:effectClrLst/>
-    <dgm:txLinClrLst/>
-    <dgm:txFillClrLst meth="repeat">
-      <a:schemeClr val="dk1"/>
-    </dgm:txFillClrLst>
-    <dgm:txEffectClrLst/>
-  </dgm:styleLbl>
-  <dgm:styleLbl name="bgShp">
-    <dgm:fillClrLst meth="repeat">
-      <a:schemeClr val="accent5">
-        <a:tint val="40000"/>
-      </a:schemeClr>
-    </dgm:fillClrLst>
-    <dgm:linClrLst meth="repeat">
-      <a:schemeClr val="dk1"/>
-    </dgm:linClrLst>
-    <dgm:effectClrLst/>
-    <dgm:txLinClrLst/>
-    <dgm:txFillClrLst meth="repeat">
-      <a:schemeClr val="dk1"/>
-    </dgm:txFillClrLst>
-    <dgm:txEffectClrLst/>
-  </dgm:styleLbl>
-  <dgm:styleLbl name="dkBgShp">
-    <dgm:fillClrLst meth="repeat">
-      <a:schemeClr val="accent5">
-        <a:shade val="90000"/>
-      </a:schemeClr>
-    </dgm:fillClrLst>
-    <dgm:linClrLst meth="repeat">
-      <a:schemeClr val="dk1"/>
-    </dgm:linClrLst>
-    <dgm:effectClrLst/>
-    <dgm:txLinClrLst/>
-    <dgm:txFillClrLst meth="repeat">
-      <a:schemeClr val="lt1"/>
-    </dgm:txFillClrLst>
-    <dgm:txEffectClrLst/>
-  </dgm:styleLbl>
-  <dgm:styleLbl name="trBgShp">
-    <dgm:fillClrLst meth="repeat">
-      <a:schemeClr val="accent5">
-        <a:tint val="50000"/>
-        <a:alpha val="40000"/>
-      </a:schemeClr>
-    </dgm:fillClrLst>
-    <dgm:linClrLst meth="repeat">
-      <a:schemeClr val="accent5"/>
-    </dgm:linClrLst>
-    <dgm:effectClrLst/>
-    <dgm:txLinClrLst/>
-    <dgm:txFillClrLst meth="repeat">
-      <a:schemeClr val="lt1"/>
-    </dgm:txFillClrLst>
-    <dgm:txEffectClrLst/>
-  </dgm:styleLbl>
-  <dgm:styleLbl name="fgShp">
-    <dgm:fillClrLst meth="repeat">
-      <a:schemeClr val="accent5">
-        <a:tint val="40000"/>
-      </a:schemeClr>
-    </dgm:fillClrLst>
-    <dgm:linClrLst meth="repeat">
-      <a:schemeClr val="lt1"/>
-    </dgm:linClrLst>
-    <dgm:effectClrLst/>
-    <dgm:txLinClrLst/>
-    <dgm:txFillClrLst meth="repeat">
-      <a:schemeClr val="dk1"/>
-    </dgm:txFillClrLst>
-    <dgm:txEffectClrLst/>
-  </dgm:styleLbl>
-  <dgm:styleLbl name="revTx">
-    <dgm:fillClrLst meth="repeat">
-      <a:schemeClr val="lt1">
-        <a:alpha val="0"/>
-      </a:schemeClr>
-    </dgm:fillClrLst>
-    <dgm:linClrLst meth="repeat">
-      <a:schemeClr val="dk1">
-        <a:alpha val="0"/>
-      </a:schemeClr>
-    </dgm:linClrLst>
-    <dgm:effectClrLst/>
-    <dgm:txLinClrLst/>
-    <dgm:txFillClrLst meth="repeat">
-      <a:schemeClr val="tx1"/>
-    </dgm:txFillClrLst>
-    <dgm:txEffectClrLst/>
-  </dgm:styleLbl>
-</dgm:colorsDef>
-</file>
-
 <file path=ppt/diagrams/data1.xml><?xml version="1.0" encoding="utf-8"?>
 <dgm:dataModel xmlns:dgm="http://schemas.openxmlformats.org/drawingml/2006/diagram" xmlns:a="http://schemas.openxmlformats.org/drawingml/2006/main">
   <dgm:ptLst>
@@ -2138,200 +1356,6 @@
     <dgm:cxn modelId="{8FD3C6A4-286F-4D22-A80F-A29B75D0002D}" type="presParOf" srcId="{355B0827-765B-4686-BFBD-BBCF69E3038B}" destId="{5192DD3A-D912-480C-B740-F187E71AA438}" srcOrd="12" destOrd="0" presId="urn:microsoft.com/office/officeart/2005/8/layout/vList2"/>
     <dgm:cxn modelId="{103651E2-FD79-4D0F-AA71-4794E8B3522A}" type="presParOf" srcId="{355B0827-765B-4686-BFBD-BBCF69E3038B}" destId="{F19689C2-E19A-4A03-A73C-290AF14E23AC}" srcOrd="13" destOrd="0" presId="urn:microsoft.com/office/officeart/2005/8/layout/vList2"/>
     <dgm:cxn modelId="{11CA08FC-4D5D-44DD-942E-D841902805A3}" type="presParOf" srcId="{355B0827-765B-4686-BFBD-BBCF69E3038B}" destId="{2DBC1261-B5ED-4769-91F9-6D8A3BC7CAE7}" srcOrd="14" destOrd="0" presId="urn:microsoft.com/office/officeart/2005/8/layout/vList2"/>
-  </dgm:cxnLst>
-  <dgm:bg/>
-  <dgm:whole/>
-  <dgm:extLst>
-    <a:ext uri="http://schemas.microsoft.com/office/drawing/2008/diagram">
-      <dsp:dataModelExt xmlns:dsp="http://schemas.microsoft.com/office/drawing/2008/diagram" relId="rId6" minVer="http://schemas.openxmlformats.org/drawingml/2006/diagram"/>
-    </a:ext>
-  </dgm:extLst>
-</dgm:dataModel>
-</file>
-
-<file path=ppt/diagrams/data2.xml><?xml version="1.0" encoding="utf-8"?>
-<dgm:dataModel xmlns:dgm="http://schemas.openxmlformats.org/drawingml/2006/diagram" xmlns:a="http://schemas.openxmlformats.org/drawingml/2006/main">
-  <dgm:ptLst>
-    <dgm:pt modelId="{D4908C81-6375-4970-9EDC-1AAE7B610839}" type="doc">
-      <dgm:prSet loTypeId="urn:microsoft.com/office/officeart/2005/8/layout/vList2" loCatId="list" qsTypeId="urn:microsoft.com/office/officeart/2005/8/quickstyle/simple1" qsCatId="simple" csTypeId="urn:microsoft.com/office/officeart/2005/8/colors/colorful5" csCatId="colorful"/>
-      <dgm:spPr/>
-      <dgm:t>
-        <a:bodyPr/>
-        <a:lstStyle/>
-        <a:p>
-          <a:endParaRPr lang="en-US"/>
-        </a:p>
-      </dgm:t>
-    </dgm:pt>
-    <dgm:pt modelId="{B996B490-3697-4713-9283-F1F75C23FA9B}">
-      <dgm:prSet/>
-      <dgm:spPr/>
-      <dgm:t>
-        <a:bodyPr/>
-        <a:lstStyle/>
-        <a:p>
-          <a:r>
-            <a:rPr lang="en-US" b="0" i="0"/>
-            <a:t>Social media makes it easy to connect with people from around the entire world. While this is positive, it also has detrimental effects. As social media and smartphone use has increased, so have mental health conditions. </a:t>
-          </a:r>
-          <a:endParaRPr lang="en-US"/>
-        </a:p>
-      </dgm:t>
-    </dgm:pt>
-    <dgm:pt modelId="{EC8077C9-F69D-4248-BED1-AE2C0D02D9AF}" type="parTrans" cxnId="{26D683C7-BAE1-4412-955B-4664D336CF42}">
-      <dgm:prSet/>
-      <dgm:spPr/>
-      <dgm:t>
-        <a:bodyPr/>
-        <a:lstStyle/>
-        <a:p>
-          <a:endParaRPr lang="en-US"/>
-        </a:p>
-      </dgm:t>
-    </dgm:pt>
-    <dgm:pt modelId="{46552C42-B2B0-4536-A7B1-2E0A7C95D721}" type="sibTrans" cxnId="{26D683C7-BAE1-4412-955B-4664D336CF42}">
-      <dgm:prSet/>
-      <dgm:spPr/>
-      <dgm:t>
-        <a:bodyPr/>
-        <a:lstStyle/>
-        <a:p>
-          <a:endParaRPr lang="en-US"/>
-        </a:p>
-      </dgm:t>
-    </dgm:pt>
-    <dgm:pt modelId="{8F1FEE8E-2D40-475C-A13D-BBD8DC116CC6}">
-      <dgm:prSet/>
-      <dgm:spPr/>
-      <dgm:t>
-        <a:bodyPr/>
-        <a:lstStyle/>
-        <a:p>
-          <a:r>
-            <a:rPr lang="en-US" b="0" i="0"/>
-            <a:t>Of course, correlation doesn’t always mean causation. But researchers suggest that the increase in mental illness is in part connected to the increase in social media use among young people. </a:t>
-          </a:r>
-          <a:endParaRPr lang="en-US"/>
-        </a:p>
-      </dgm:t>
-    </dgm:pt>
-    <dgm:pt modelId="{D576B2BC-B8E0-48B2-913C-65A76FEA560F}" type="parTrans" cxnId="{A80C2EEE-E941-4E97-9015-C4400DF71322}">
-      <dgm:prSet/>
-      <dgm:spPr/>
-      <dgm:t>
-        <a:bodyPr/>
-        <a:lstStyle/>
-        <a:p>
-          <a:endParaRPr lang="en-US"/>
-        </a:p>
-      </dgm:t>
-    </dgm:pt>
-    <dgm:pt modelId="{38ADAA74-1A48-4B15-B913-AD681C01ECA0}" type="sibTrans" cxnId="{A80C2EEE-E941-4E97-9015-C4400DF71322}">
-      <dgm:prSet/>
-      <dgm:spPr/>
-      <dgm:t>
-        <a:bodyPr/>
-        <a:lstStyle/>
-        <a:p>
-          <a:endParaRPr lang="en-US"/>
-        </a:p>
-      </dgm:t>
-    </dgm:pt>
-    <dgm:pt modelId="{50FA1FA6-5276-48B8-B31D-497938EF4160}">
-      <dgm:prSet/>
-      <dgm:spPr/>
-      <dgm:t>
-        <a:bodyPr/>
-        <a:lstStyle/>
-        <a:p>
-          <a:r>
-            <a:rPr lang="en-US" b="0" i="0"/>
-            <a:t>Experiencing psychological distress in a given month grew 71% in young adults from 2008 to 2017. Even worse, the rate of suicidal thoughts in young adults increased 47% during that same time.</a:t>
-          </a:r>
-          <a:endParaRPr lang="en-US"/>
-        </a:p>
-      </dgm:t>
-    </dgm:pt>
-    <dgm:pt modelId="{3CB583BA-8A54-4CA5-8F5D-08F4552CF6E6}" type="parTrans" cxnId="{72E800E8-9962-44B4-9E52-8DCBA9702E53}">
-      <dgm:prSet/>
-      <dgm:spPr/>
-      <dgm:t>
-        <a:bodyPr/>
-        <a:lstStyle/>
-        <a:p>
-          <a:endParaRPr lang="en-US"/>
-        </a:p>
-      </dgm:t>
-    </dgm:pt>
-    <dgm:pt modelId="{1E330F47-7089-4D66-BC4C-981153624DE0}" type="sibTrans" cxnId="{72E800E8-9962-44B4-9E52-8DCBA9702E53}">
-      <dgm:prSet/>
-      <dgm:spPr/>
-      <dgm:t>
-        <a:bodyPr/>
-        <a:lstStyle/>
-        <a:p>
-          <a:endParaRPr lang="en-US"/>
-        </a:p>
-      </dgm:t>
-    </dgm:pt>
-    <dgm:pt modelId="{A9B5B5D3-D727-47E2-B4F2-AD2EA76F810E}" type="pres">
-      <dgm:prSet presAssocID="{D4908C81-6375-4970-9EDC-1AAE7B610839}" presName="linear" presStyleCnt="0">
-        <dgm:presLayoutVars>
-          <dgm:animLvl val="lvl"/>
-          <dgm:resizeHandles val="exact"/>
-        </dgm:presLayoutVars>
-      </dgm:prSet>
-      <dgm:spPr/>
-    </dgm:pt>
-    <dgm:pt modelId="{043BE00C-71E7-47A5-9184-842DFF6FCA8A}" type="pres">
-      <dgm:prSet presAssocID="{B996B490-3697-4713-9283-F1F75C23FA9B}" presName="parentText" presStyleLbl="node1" presStyleIdx="0" presStyleCnt="3">
-        <dgm:presLayoutVars>
-          <dgm:chMax val="0"/>
-          <dgm:bulletEnabled val="1"/>
-        </dgm:presLayoutVars>
-      </dgm:prSet>
-      <dgm:spPr/>
-    </dgm:pt>
-    <dgm:pt modelId="{9241BEA7-DD29-4D68-AC8B-5D87A45F834A}" type="pres">
-      <dgm:prSet presAssocID="{46552C42-B2B0-4536-A7B1-2E0A7C95D721}" presName="spacer" presStyleCnt="0"/>
-      <dgm:spPr/>
-    </dgm:pt>
-    <dgm:pt modelId="{03976F25-B9B1-4EBE-8F5D-64FC9FFDEC3B}" type="pres">
-      <dgm:prSet presAssocID="{8F1FEE8E-2D40-475C-A13D-BBD8DC116CC6}" presName="parentText" presStyleLbl="node1" presStyleIdx="1" presStyleCnt="3">
-        <dgm:presLayoutVars>
-          <dgm:chMax val="0"/>
-          <dgm:bulletEnabled val="1"/>
-        </dgm:presLayoutVars>
-      </dgm:prSet>
-      <dgm:spPr/>
-    </dgm:pt>
-    <dgm:pt modelId="{C4782C1D-EF75-4DDD-B0BF-BAA98450A59D}" type="pres">
-      <dgm:prSet presAssocID="{38ADAA74-1A48-4B15-B913-AD681C01ECA0}" presName="spacer" presStyleCnt="0"/>
-      <dgm:spPr/>
-    </dgm:pt>
-    <dgm:pt modelId="{1734972A-CE05-4056-B2AB-02180F6736D2}" type="pres">
-      <dgm:prSet presAssocID="{50FA1FA6-5276-48B8-B31D-497938EF4160}" presName="parentText" presStyleLbl="node1" presStyleIdx="2" presStyleCnt="3">
-        <dgm:presLayoutVars>
-          <dgm:chMax val="0"/>
-          <dgm:bulletEnabled val="1"/>
-        </dgm:presLayoutVars>
-      </dgm:prSet>
-      <dgm:spPr/>
-    </dgm:pt>
-  </dgm:ptLst>
-  <dgm:cxnLst>
-    <dgm:cxn modelId="{0F672623-0E15-42D0-B300-340E47FF0500}" type="presOf" srcId="{D4908C81-6375-4970-9EDC-1AAE7B610839}" destId="{A9B5B5D3-D727-47E2-B4F2-AD2EA76F810E}" srcOrd="0" destOrd="0" presId="urn:microsoft.com/office/officeart/2005/8/layout/vList2"/>
-    <dgm:cxn modelId="{A7D0D43F-21E7-4697-99C9-60150F0C8C1A}" type="presOf" srcId="{50FA1FA6-5276-48B8-B31D-497938EF4160}" destId="{1734972A-CE05-4056-B2AB-02180F6736D2}" srcOrd="0" destOrd="0" presId="urn:microsoft.com/office/officeart/2005/8/layout/vList2"/>
-    <dgm:cxn modelId="{F15A20BB-E675-40BC-8E47-565AF9EB01C1}" type="presOf" srcId="{B996B490-3697-4713-9283-F1F75C23FA9B}" destId="{043BE00C-71E7-47A5-9184-842DFF6FCA8A}" srcOrd="0" destOrd="0" presId="urn:microsoft.com/office/officeart/2005/8/layout/vList2"/>
-    <dgm:cxn modelId="{26D683C7-BAE1-4412-955B-4664D336CF42}" srcId="{D4908C81-6375-4970-9EDC-1AAE7B610839}" destId="{B996B490-3697-4713-9283-F1F75C23FA9B}" srcOrd="0" destOrd="0" parTransId="{EC8077C9-F69D-4248-BED1-AE2C0D02D9AF}" sibTransId="{46552C42-B2B0-4536-A7B1-2E0A7C95D721}"/>
-    <dgm:cxn modelId="{72E800E8-9962-44B4-9E52-8DCBA9702E53}" srcId="{D4908C81-6375-4970-9EDC-1AAE7B610839}" destId="{50FA1FA6-5276-48B8-B31D-497938EF4160}" srcOrd="2" destOrd="0" parTransId="{3CB583BA-8A54-4CA5-8F5D-08F4552CF6E6}" sibTransId="{1E330F47-7089-4D66-BC4C-981153624DE0}"/>
-    <dgm:cxn modelId="{89D8A4ED-9453-4972-B8CE-AD24E8360E28}" type="presOf" srcId="{8F1FEE8E-2D40-475C-A13D-BBD8DC116CC6}" destId="{03976F25-B9B1-4EBE-8F5D-64FC9FFDEC3B}" srcOrd="0" destOrd="0" presId="urn:microsoft.com/office/officeart/2005/8/layout/vList2"/>
-    <dgm:cxn modelId="{A80C2EEE-E941-4E97-9015-C4400DF71322}" srcId="{D4908C81-6375-4970-9EDC-1AAE7B610839}" destId="{8F1FEE8E-2D40-475C-A13D-BBD8DC116CC6}" srcOrd="1" destOrd="0" parTransId="{D576B2BC-B8E0-48B2-913C-65A76FEA560F}" sibTransId="{38ADAA74-1A48-4B15-B913-AD681C01ECA0}"/>
-    <dgm:cxn modelId="{5B1AEED8-26FD-4618-A03B-E7B379E86236}" type="presParOf" srcId="{A9B5B5D3-D727-47E2-B4F2-AD2EA76F810E}" destId="{043BE00C-71E7-47A5-9184-842DFF6FCA8A}" srcOrd="0" destOrd="0" presId="urn:microsoft.com/office/officeart/2005/8/layout/vList2"/>
-    <dgm:cxn modelId="{D2C5CFA2-AEC6-4780-ABF2-47D641CD5FE1}" type="presParOf" srcId="{A9B5B5D3-D727-47E2-B4F2-AD2EA76F810E}" destId="{9241BEA7-DD29-4D68-AC8B-5D87A45F834A}" srcOrd="1" destOrd="0" presId="urn:microsoft.com/office/officeart/2005/8/layout/vList2"/>
-    <dgm:cxn modelId="{86DFD92E-BF60-412F-AF98-BA4388966AED}" type="presParOf" srcId="{A9B5B5D3-D727-47E2-B4F2-AD2EA76F810E}" destId="{03976F25-B9B1-4EBE-8F5D-64FC9FFDEC3B}" srcOrd="2" destOrd="0" presId="urn:microsoft.com/office/officeart/2005/8/layout/vList2"/>
-    <dgm:cxn modelId="{7D520702-349D-40B9-A819-8FCD2AE4B8A8}" type="presParOf" srcId="{A9B5B5D3-D727-47E2-B4F2-AD2EA76F810E}" destId="{C4782C1D-EF75-4DDD-B0BF-BAA98450A59D}" srcOrd="3" destOrd="0" presId="urn:microsoft.com/office/officeart/2005/8/layout/vList2"/>
-    <dgm:cxn modelId="{B788B109-6E1F-4C69-A9EE-8F37F2EE3986}" type="presParOf" srcId="{A9B5B5D3-D727-47E2-B4F2-AD2EA76F810E}" destId="{1734972A-CE05-4056-B2AB-02180F6736D2}" srcOrd="4" destOrd="0" presId="urn:microsoft.com/office/officeart/2005/8/layout/vList2"/>
   </dgm:cxnLst>
   <dgm:bg/>
   <dgm:whole/>
@@ -2979,423 +2003,7 @@
 </dsp:drawing>
 </file>
 
-<file path=ppt/diagrams/drawing2.xml><?xml version="1.0" encoding="utf-8"?>
-<dsp:drawing xmlns:dgm="http://schemas.openxmlformats.org/drawingml/2006/diagram" xmlns:dsp="http://schemas.microsoft.com/office/drawing/2008/diagram" xmlns:a="http://schemas.openxmlformats.org/drawingml/2006/main">
-  <dsp:spTree>
-    <dsp:nvGrpSpPr>
-      <dsp:cNvPr id="0" name=""/>
-      <dsp:cNvGrpSpPr/>
-    </dsp:nvGrpSpPr>
-    <dsp:grpSpPr/>
-    <dsp:sp modelId="{043BE00C-71E7-47A5-9184-842DFF6FCA8A}">
-      <dsp:nvSpPr>
-        <dsp:cNvPr id="0" name=""/>
-        <dsp:cNvSpPr/>
-      </dsp:nvSpPr>
-      <dsp:spPr>
-        <a:xfrm>
-          <a:off x="0" y="490673"/>
-          <a:ext cx="6245265" cy="1497600"/>
-        </a:xfrm>
-        <a:prstGeom prst="roundRect">
-          <a:avLst/>
-        </a:prstGeom>
-        <a:solidFill>
-          <a:schemeClr val="accent5">
-            <a:hueOff val="0"/>
-            <a:satOff val="0"/>
-            <a:lumOff val="0"/>
-            <a:alphaOff val="0"/>
-          </a:schemeClr>
-        </a:solidFill>
-        <a:ln w="12700" cap="flat" cmpd="sng" algn="ctr">
-          <a:solidFill>
-            <a:schemeClr val="lt1">
-              <a:hueOff val="0"/>
-              <a:satOff val="0"/>
-              <a:lumOff val="0"/>
-              <a:alphaOff val="0"/>
-            </a:schemeClr>
-          </a:solidFill>
-          <a:prstDash val="solid"/>
-          <a:miter lim="800000"/>
-        </a:ln>
-        <a:effectLst/>
-      </dsp:spPr>
-      <dsp:style>
-        <a:lnRef idx="2">
-          <a:scrgbClr r="0" g="0" b="0"/>
-        </a:lnRef>
-        <a:fillRef idx="1">
-          <a:scrgbClr r="0" g="0" b="0"/>
-        </a:fillRef>
-        <a:effectRef idx="0">
-          <a:scrgbClr r="0" g="0" b="0"/>
-        </a:effectRef>
-        <a:fontRef idx="minor">
-          <a:schemeClr val="lt1"/>
-        </a:fontRef>
-      </dsp:style>
-      <dsp:txBody>
-        <a:bodyPr spcFirstLastPara="0" vert="horz" wrap="square" lIns="76200" tIns="76200" rIns="76200" bIns="76200" numCol="1" spcCol="1270" anchor="ctr" anchorCtr="0">
-          <a:noAutofit/>
-        </a:bodyPr>
-        <a:lstStyle/>
-        <a:p>
-          <a:pPr marL="0" lvl="0" indent="0" algn="l" defTabSz="889000">
-            <a:lnSpc>
-              <a:spcPct val="90000"/>
-            </a:lnSpc>
-            <a:spcBef>
-              <a:spcPct val="0"/>
-            </a:spcBef>
-            <a:spcAft>
-              <a:spcPct val="35000"/>
-            </a:spcAft>
-            <a:buNone/>
-          </a:pPr>
-          <a:r>
-            <a:rPr lang="en-US" sz="2000" b="0" i="0" kern="1200"/>
-            <a:t>Social media makes it easy to connect with people from around the entire world. While this is positive, it also has detrimental effects. As social media and smartphone use has increased, so have mental health conditions. </a:t>
-          </a:r>
-          <a:endParaRPr lang="en-US" sz="2000" kern="1200"/>
-        </a:p>
-      </dsp:txBody>
-      <dsp:txXfrm>
-        <a:off x="73107" y="563780"/>
-        <a:ext cx="6099051" cy="1351386"/>
-      </dsp:txXfrm>
-    </dsp:sp>
-    <dsp:sp modelId="{03976F25-B9B1-4EBE-8F5D-64FC9FFDEC3B}">
-      <dsp:nvSpPr>
-        <dsp:cNvPr id="0" name=""/>
-        <dsp:cNvSpPr/>
-      </dsp:nvSpPr>
-      <dsp:spPr>
-        <a:xfrm>
-          <a:off x="0" y="2045873"/>
-          <a:ext cx="6245265" cy="1497600"/>
-        </a:xfrm>
-        <a:prstGeom prst="roundRect">
-          <a:avLst/>
-        </a:prstGeom>
-        <a:solidFill>
-          <a:schemeClr val="accent5">
-            <a:hueOff val="-3770740"/>
-            <a:satOff val="0"/>
-            <a:lumOff val="-490"/>
-            <a:alphaOff val="0"/>
-          </a:schemeClr>
-        </a:solidFill>
-        <a:ln w="12700" cap="flat" cmpd="sng" algn="ctr">
-          <a:solidFill>
-            <a:schemeClr val="lt1">
-              <a:hueOff val="0"/>
-              <a:satOff val="0"/>
-              <a:lumOff val="0"/>
-              <a:alphaOff val="0"/>
-            </a:schemeClr>
-          </a:solidFill>
-          <a:prstDash val="solid"/>
-          <a:miter lim="800000"/>
-        </a:ln>
-        <a:effectLst/>
-      </dsp:spPr>
-      <dsp:style>
-        <a:lnRef idx="2">
-          <a:scrgbClr r="0" g="0" b="0"/>
-        </a:lnRef>
-        <a:fillRef idx="1">
-          <a:scrgbClr r="0" g="0" b="0"/>
-        </a:fillRef>
-        <a:effectRef idx="0">
-          <a:scrgbClr r="0" g="0" b="0"/>
-        </a:effectRef>
-        <a:fontRef idx="minor">
-          <a:schemeClr val="lt1"/>
-        </a:fontRef>
-      </dsp:style>
-      <dsp:txBody>
-        <a:bodyPr spcFirstLastPara="0" vert="horz" wrap="square" lIns="76200" tIns="76200" rIns="76200" bIns="76200" numCol="1" spcCol="1270" anchor="ctr" anchorCtr="0">
-          <a:noAutofit/>
-        </a:bodyPr>
-        <a:lstStyle/>
-        <a:p>
-          <a:pPr marL="0" lvl="0" indent="0" algn="l" defTabSz="889000">
-            <a:lnSpc>
-              <a:spcPct val="90000"/>
-            </a:lnSpc>
-            <a:spcBef>
-              <a:spcPct val="0"/>
-            </a:spcBef>
-            <a:spcAft>
-              <a:spcPct val="35000"/>
-            </a:spcAft>
-            <a:buNone/>
-          </a:pPr>
-          <a:r>
-            <a:rPr lang="en-US" sz="2000" b="0" i="0" kern="1200"/>
-            <a:t>Of course, correlation doesn’t always mean causation. But researchers suggest that the increase in mental illness is in part connected to the increase in social media use among young people. </a:t>
-          </a:r>
-          <a:endParaRPr lang="en-US" sz="2000" kern="1200"/>
-        </a:p>
-      </dsp:txBody>
-      <dsp:txXfrm>
-        <a:off x="73107" y="2118980"/>
-        <a:ext cx="6099051" cy="1351386"/>
-      </dsp:txXfrm>
-    </dsp:sp>
-    <dsp:sp modelId="{1734972A-CE05-4056-B2AB-02180F6736D2}">
-      <dsp:nvSpPr>
-        <dsp:cNvPr id="0" name=""/>
-        <dsp:cNvSpPr/>
-      </dsp:nvSpPr>
-      <dsp:spPr>
-        <a:xfrm>
-          <a:off x="0" y="3601073"/>
-          <a:ext cx="6245265" cy="1497600"/>
-        </a:xfrm>
-        <a:prstGeom prst="roundRect">
-          <a:avLst/>
-        </a:prstGeom>
-        <a:solidFill>
-          <a:schemeClr val="accent5">
-            <a:hueOff val="-7541480"/>
-            <a:satOff val="0"/>
-            <a:lumOff val="-980"/>
-            <a:alphaOff val="0"/>
-          </a:schemeClr>
-        </a:solidFill>
-        <a:ln w="12700" cap="flat" cmpd="sng" algn="ctr">
-          <a:solidFill>
-            <a:schemeClr val="lt1">
-              <a:hueOff val="0"/>
-              <a:satOff val="0"/>
-              <a:lumOff val="0"/>
-              <a:alphaOff val="0"/>
-            </a:schemeClr>
-          </a:solidFill>
-          <a:prstDash val="solid"/>
-          <a:miter lim="800000"/>
-        </a:ln>
-        <a:effectLst/>
-      </dsp:spPr>
-      <dsp:style>
-        <a:lnRef idx="2">
-          <a:scrgbClr r="0" g="0" b="0"/>
-        </a:lnRef>
-        <a:fillRef idx="1">
-          <a:scrgbClr r="0" g="0" b="0"/>
-        </a:fillRef>
-        <a:effectRef idx="0">
-          <a:scrgbClr r="0" g="0" b="0"/>
-        </a:effectRef>
-        <a:fontRef idx="minor">
-          <a:schemeClr val="lt1"/>
-        </a:fontRef>
-      </dsp:style>
-      <dsp:txBody>
-        <a:bodyPr spcFirstLastPara="0" vert="horz" wrap="square" lIns="76200" tIns="76200" rIns="76200" bIns="76200" numCol="1" spcCol="1270" anchor="ctr" anchorCtr="0">
-          <a:noAutofit/>
-        </a:bodyPr>
-        <a:lstStyle/>
-        <a:p>
-          <a:pPr marL="0" lvl="0" indent="0" algn="l" defTabSz="889000">
-            <a:lnSpc>
-              <a:spcPct val="90000"/>
-            </a:lnSpc>
-            <a:spcBef>
-              <a:spcPct val="0"/>
-            </a:spcBef>
-            <a:spcAft>
-              <a:spcPct val="35000"/>
-            </a:spcAft>
-            <a:buNone/>
-          </a:pPr>
-          <a:r>
-            <a:rPr lang="en-US" sz="2000" b="0" i="0" kern="1200"/>
-            <a:t>Experiencing psychological distress in a given month grew 71% in young adults from 2008 to 2017. Even worse, the rate of suicidal thoughts in young adults increased 47% during that same time.</a:t>
-          </a:r>
-          <a:endParaRPr lang="en-US" sz="2000" kern="1200"/>
-        </a:p>
-      </dsp:txBody>
-      <dsp:txXfrm>
-        <a:off x="73107" y="3674180"/>
-        <a:ext cx="6099051" cy="1351386"/>
-      </dsp:txXfrm>
-    </dsp:sp>
-  </dsp:spTree>
-</dsp:drawing>
-</file>
-
 <file path=ppt/diagrams/layout1.xml><?xml version="1.0" encoding="utf-8"?>
-<dgm:layoutDef xmlns:dgm="http://schemas.openxmlformats.org/drawingml/2006/diagram" xmlns:a="http://schemas.openxmlformats.org/drawingml/2006/main" uniqueId="urn:microsoft.com/office/officeart/2005/8/layout/vList2">
-  <dgm:title val=""/>
-  <dgm:desc val=""/>
-  <dgm:catLst>
-    <dgm:cat type="list" pri="3000"/>
-    <dgm:cat type="convert" pri="1000"/>
-  </dgm:catLst>
-  <dgm:sampData>
-    <dgm:dataModel>
-      <dgm:ptLst>
-        <dgm:pt modelId="0" type="doc"/>
-        <dgm:pt modelId="1">
-          <dgm:prSet phldr="1"/>
-        </dgm:pt>
-        <dgm:pt modelId="11">
-          <dgm:prSet phldr="1"/>
-        </dgm:pt>
-        <dgm:pt modelId="2">
-          <dgm:prSet phldr="1"/>
-        </dgm:pt>
-        <dgm:pt modelId="21">
-          <dgm:prSet phldr="1"/>
-        </dgm:pt>
-      </dgm:ptLst>
-      <dgm:cxnLst>
-        <dgm:cxn modelId="4" srcId="0" destId="1" srcOrd="0" destOrd="0"/>
-        <dgm:cxn modelId="5" srcId="0" destId="2" srcOrd="1" destOrd="0"/>
-        <dgm:cxn modelId="12" srcId="1" destId="11" srcOrd="0" destOrd="0"/>
-        <dgm:cxn modelId="23" srcId="2" destId="21" srcOrd="0" destOrd="0"/>
-      </dgm:cxnLst>
-      <dgm:bg/>
-      <dgm:whole/>
-    </dgm:dataModel>
-  </dgm:sampData>
-  <dgm:styleData>
-    <dgm:dataModel>
-      <dgm:ptLst>
-        <dgm:pt modelId="0" type="doc"/>
-        <dgm:pt modelId="1"/>
-        <dgm:pt modelId="2"/>
-      </dgm:ptLst>
-      <dgm:cxnLst>
-        <dgm:cxn modelId="3" srcId="0" destId="1" srcOrd="0" destOrd="0"/>
-        <dgm:cxn modelId="4" srcId="0" destId="2" srcOrd="1" destOrd="0"/>
-      </dgm:cxnLst>
-      <dgm:bg/>
-      <dgm:whole/>
-    </dgm:dataModel>
-  </dgm:styleData>
-  <dgm:clrData>
-    <dgm:dataModel>
-      <dgm:ptLst>
-        <dgm:pt modelId="0" type="doc"/>
-        <dgm:pt modelId="1"/>
-        <dgm:pt modelId="2"/>
-        <dgm:pt modelId="3"/>
-        <dgm:pt modelId="4"/>
-      </dgm:ptLst>
-      <dgm:cxnLst>
-        <dgm:cxn modelId="5" srcId="0" destId="1" srcOrd="0" destOrd="0"/>
-        <dgm:cxn modelId="6" srcId="0" destId="2" srcOrd="1" destOrd="0"/>
-        <dgm:cxn modelId="7" srcId="0" destId="3" srcOrd="2" destOrd="0"/>
-        <dgm:cxn modelId="8" srcId="0" destId="4" srcOrd="3" destOrd="0"/>
-      </dgm:cxnLst>
-      <dgm:bg/>
-      <dgm:whole/>
-    </dgm:dataModel>
-  </dgm:clrData>
-  <dgm:layoutNode name="linear">
-    <dgm:varLst>
-      <dgm:animLvl val="lvl"/>
-      <dgm:resizeHandles val="exact"/>
-    </dgm:varLst>
-    <dgm:alg type="lin">
-      <dgm:param type="linDir" val="fromT"/>
-      <dgm:param type="vertAlign" val="mid"/>
-    </dgm:alg>
-    <dgm:shape xmlns:r="http://schemas.openxmlformats.org/officeDocument/2006/relationships" r:blip="">
-      <dgm:adjLst/>
-    </dgm:shape>
-    <dgm:presOf/>
-    <dgm:constrLst>
-      <dgm:constr type="w" for="ch" forName="parentText" refType="w"/>
-      <dgm:constr type="h" for="ch" forName="parentText" refType="primFontSz" refFor="ch" refForName="parentText" fact="0.52"/>
-      <dgm:constr type="w" for="ch" forName="childText" refType="w"/>
-      <dgm:constr type="h" for="ch" forName="childText" refType="primFontSz" refFor="ch" refForName="parentText" fact="0.46"/>
-      <dgm:constr type="h" for="ch" forName="parentText" op="equ"/>
-      <dgm:constr type="primFontSz" for="ch" forName="parentText" op="equ" val="65"/>
-      <dgm:constr type="primFontSz" for="ch" forName="childText" refType="primFontSz" refFor="ch" refForName="parentText" op="equ"/>
-      <dgm:constr type="h" for="ch" forName="spacer" refType="primFontSz" refFor="ch" refForName="parentText" fact="0.08"/>
-    </dgm:constrLst>
-    <dgm:ruleLst>
-      <dgm:rule type="primFontSz" for="ch" forName="parentText" val="5" fact="NaN" max="NaN"/>
-    </dgm:ruleLst>
-    <dgm:forEach name="Name0" axis="ch" ptType="node">
-      <dgm:layoutNode name="parentText" styleLbl="node1">
-        <dgm:varLst>
-          <dgm:chMax val="0"/>
-          <dgm:bulletEnabled val="1"/>
-        </dgm:varLst>
-        <dgm:alg type="tx">
-          <dgm:param type="parTxLTRAlign" val="l"/>
-          <dgm:param type="parTxRTLAlign" val="r"/>
-        </dgm:alg>
-        <dgm:shape xmlns:r="http://schemas.openxmlformats.org/officeDocument/2006/relationships" type="roundRect" r:blip="">
-          <dgm:adjLst/>
-        </dgm:shape>
-        <dgm:presOf axis="self"/>
-        <dgm:constrLst>
-          <dgm:constr type="tMarg" refType="primFontSz" fact="0.3"/>
-          <dgm:constr type="bMarg" refType="primFontSz" fact="0.3"/>
-          <dgm:constr type="lMarg" refType="primFontSz" fact="0.3"/>
-          <dgm:constr type="rMarg" refType="primFontSz" fact="0.3"/>
-        </dgm:constrLst>
-        <dgm:ruleLst>
-          <dgm:rule type="h" val="INF" fact="NaN" max="NaN"/>
-        </dgm:ruleLst>
-      </dgm:layoutNode>
-      <dgm:choose name="Name1">
-        <dgm:if name="Name2" axis="ch" ptType="node" func="cnt" op="gte" val="1">
-          <dgm:layoutNode name="childText" styleLbl="revTx">
-            <dgm:varLst>
-              <dgm:bulletEnabled val="1"/>
-            </dgm:varLst>
-            <dgm:alg type="tx">
-              <dgm:param type="stBulletLvl" val="1"/>
-              <dgm:param type="lnSpAfChP" val="20"/>
-            </dgm:alg>
-            <dgm:shape xmlns:r="http://schemas.openxmlformats.org/officeDocument/2006/relationships" type="rect" r:blip="">
-              <dgm:adjLst/>
-            </dgm:shape>
-            <dgm:presOf axis="des" ptType="node"/>
-            <dgm:constrLst>
-              <dgm:constr type="tMarg" refType="primFontSz" fact="0.1"/>
-              <dgm:constr type="bMarg" refType="primFontSz" fact="0.1"/>
-              <dgm:constr type="lMarg" refType="w" fact="0.09"/>
-            </dgm:constrLst>
-            <dgm:ruleLst>
-              <dgm:rule type="h" val="INF" fact="NaN" max="NaN"/>
-            </dgm:ruleLst>
-          </dgm:layoutNode>
-        </dgm:if>
-        <dgm:else name="Name3">
-          <dgm:choose name="Name4">
-            <dgm:if name="Name5" axis="par ch" ptType="doc node" func="cnt" op="gte" val="2">
-              <dgm:forEach name="Name6" axis="followSib" ptType="sibTrans" cnt="1">
-                <dgm:layoutNode name="spacer">
-                  <dgm:alg type="sp"/>
-                  <dgm:shape xmlns:r="http://schemas.openxmlformats.org/officeDocument/2006/relationships" r:blip="">
-                    <dgm:adjLst/>
-                  </dgm:shape>
-                  <dgm:presOf/>
-                  <dgm:constrLst/>
-                  <dgm:ruleLst/>
-                </dgm:layoutNode>
-              </dgm:forEach>
-            </dgm:if>
-            <dgm:else name="Name7"/>
-          </dgm:choose>
-        </dgm:else>
-      </dgm:choose>
-    </dgm:forEach>
-  </dgm:layoutNode>
-</dgm:layoutDef>
-</file>
-
-<file path=ppt/diagrams/layout2.xml><?xml version="1.0" encoding="utf-8"?>
 <dgm:layoutDef xmlns:dgm="http://schemas.openxmlformats.org/drawingml/2006/diagram" xmlns:a="http://schemas.openxmlformats.org/drawingml/2006/main" uniqueId="urn:microsoft.com/office/officeart/2005/8/layout/vList2">
   <dgm:title val=""/>
   <dgm:desc val=""/>
@@ -4596,1040 +3204,6 @@
 </dgm:styleDef>
 </file>
 
-<file path=ppt/diagrams/quickStyle2.xml><?xml version="1.0" encoding="utf-8"?>
-<dgm:styleDef xmlns:dgm="http://schemas.openxmlformats.org/drawingml/2006/diagram" xmlns:a="http://schemas.openxmlformats.org/drawingml/2006/main" uniqueId="urn:microsoft.com/office/officeart/2005/8/quickstyle/simple1">
-  <dgm:title val=""/>
-  <dgm:desc val=""/>
-  <dgm:catLst>
-    <dgm:cat type="simple" pri="10100"/>
-  </dgm:catLst>
-  <dgm:scene3d>
-    <a:camera prst="orthographicFront"/>
-    <a:lightRig rig="threePt" dir="t"/>
-  </dgm:scene3d>
-  <dgm:styleLbl name="node0">
-    <dgm:scene3d>
-      <a:camera prst="orthographicFront"/>
-      <a:lightRig rig="threePt" dir="t"/>
-    </dgm:scene3d>
-    <dgm:sp3d/>
-    <dgm:txPr/>
-    <dgm:style>
-      <a:lnRef idx="2">
-        <a:scrgbClr r="0" g="0" b="0"/>
-      </a:lnRef>
-      <a:fillRef idx="1">
-        <a:scrgbClr r="0" g="0" b="0"/>
-      </a:fillRef>
-      <a:effectRef idx="0">
-        <a:scrgbClr r="0" g="0" b="0"/>
-      </a:effectRef>
-      <a:fontRef idx="minor">
-        <a:schemeClr val="lt1"/>
-      </a:fontRef>
-    </dgm:style>
-  </dgm:styleLbl>
-  <dgm:styleLbl name="lnNode1">
-    <dgm:scene3d>
-      <a:camera prst="orthographicFront"/>
-      <a:lightRig rig="threePt" dir="t"/>
-    </dgm:scene3d>
-    <dgm:sp3d/>
-    <dgm:txPr/>
-    <dgm:style>
-      <a:lnRef idx="2">
-        <a:scrgbClr r="0" g="0" b="0"/>
-      </a:lnRef>
-      <a:fillRef idx="1">
-        <a:scrgbClr r="0" g="0" b="0"/>
-      </a:fillRef>
-      <a:effectRef idx="0">
-        <a:scrgbClr r="0" g="0" b="0"/>
-      </a:effectRef>
-      <a:fontRef idx="minor">
-        <a:schemeClr val="lt1"/>
-      </a:fontRef>
-    </dgm:style>
-  </dgm:styleLbl>
-  <dgm:styleLbl name="vennNode1">
-    <dgm:scene3d>
-      <a:camera prst="orthographicFront"/>
-      <a:lightRig rig="threePt" dir="t"/>
-    </dgm:scene3d>
-    <dgm:sp3d/>
-    <dgm:txPr/>
-    <dgm:style>
-      <a:lnRef idx="2">
-        <a:scrgbClr r="0" g="0" b="0"/>
-      </a:lnRef>
-      <a:fillRef idx="1">
-        <a:scrgbClr r="0" g="0" b="0"/>
-      </a:fillRef>
-      <a:effectRef idx="0">
-        <a:scrgbClr r="0" g="0" b="0"/>
-      </a:effectRef>
-      <a:fontRef idx="minor">
-        <a:schemeClr val="tx1"/>
-      </a:fontRef>
-    </dgm:style>
-  </dgm:styleLbl>
-  <dgm:styleLbl name="alignNode1">
-    <dgm:scene3d>
-      <a:camera prst="orthographicFront"/>
-      <a:lightRig rig="threePt" dir="t"/>
-    </dgm:scene3d>
-    <dgm:sp3d/>
-    <dgm:txPr/>
-    <dgm:style>
-      <a:lnRef idx="2">
-        <a:scrgbClr r="0" g="0" b="0"/>
-      </a:lnRef>
-      <a:fillRef idx="1">
-        <a:scrgbClr r="0" g="0" b="0"/>
-      </a:fillRef>
-      <a:effectRef idx="0">
-        <a:scrgbClr r="0" g="0" b="0"/>
-      </a:effectRef>
-      <a:fontRef idx="minor">
-        <a:schemeClr val="lt1"/>
-      </a:fontRef>
-    </dgm:style>
-  </dgm:styleLbl>
-  <dgm:styleLbl name="node1">
-    <dgm:scene3d>
-      <a:camera prst="orthographicFront"/>
-      <a:lightRig rig="threePt" dir="t"/>
-    </dgm:scene3d>
-    <dgm:sp3d/>
-    <dgm:txPr/>
-    <dgm:style>
-      <a:lnRef idx="2">
-        <a:scrgbClr r="0" g="0" b="0"/>
-      </a:lnRef>
-      <a:fillRef idx="1">
-        <a:scrgbClr r="0" g="0" b="0"/>
-      </a:fillRef>
-      <a:effectRef idx="0">
-        <a:scrgbClr r="0" g="0" b="0"/>
-      </a:effectRef>
-      <a:fontRef idx="minor">
-        <a:schemeClr val="lt1"/>
-      </a:fontRef>
-    </dgm:style>
-  </dgm:styleLbl>
-  <dgm:styleLbl name="node2">
-    <dgm:scene3d>
-      <a:camera prst="orthographicFront"/>
-      <a:lightRig rig="threePt" dir="t"/>
-    </dgm:scene3d>
-    <dgm:sp3d/>
-    <dgm:txPr/>
-    <dgm:style>
-      <a:lnRef idx="2">
-        <a:scrgbClr r="0" g="0" b="0"/>
-      </a:lnRef>
-      <a:fillRef idx="1">
-        <a:scrgbClr r="0" g="0" b="0"/>
-      </a:fillRef>
-      <a:effectRef idx="0">
-        <a:scrgbClr r="0" g="0" b="0"/>
-      </a:effectRef>
-      <a:fontRef idx="minor">
-        <a:schemeClr val="lt1"/>
-      </a:fontRef>
-    </dgm:style>
-  </dgm:styleLbl>
-  <dgm:styleLbl name="node3">
-    <dgm:scene3d>
-      <a:camera prst="orthographicFront"/>
-      <a:lightRig rig="threePt" dir="t"/>
-    </dgm:scene3d>
-    <dgm:sp3d/>
-    <dgm:txPr/>
-    <dgm:style>
-      <a:lnRef idx="2">
-        <a:scrgbClr r="0" g="0" b="0"/>
-      </a:lnRef>
-      <a:fillRef idx="1">
-        <a:scrgbClr r="0" g="0" b="0"/>
-      </a:fillRef>
-      <a:effectRef idx="0">
-        <a:scrgbClr r="0" g="0" b="0"/>
-      </a:effectRef>
-      <a:fontRef idx="minor">
-        <a:schemeClr val="lt1"/>
-      </a:fontRef>
-    </dgm:style>
-  </dgm:styleLbl>
-  <dgm:styleLbl name="node4">
-    <dgm:scene3d>
-      <a:camera prst="orthographicFront"/>
-      <a:lightRig rig="threePt" dir="t"/>
-    </dgm:scene3d>
-    <dgm:sp3d/>
-    <dgm:txPr/>
-    <dgm:style>
-      <a:lnRef idx="2">
-        <a:scrgbClr r="0" g="0" b="0"/>
-      </a:lnRef>
-      <a:fillRef idx="1">
-        <a:scrgbClr r="0" g="0" b="0"/>
-      </a:fillRef>
-      <a:effectRef idx="0">
-        <a:scrgbClr r="0" g="0" b="0"/>
-      </a:effectRef>
-      <a:fontRef idx="minor">
-        <a:schemeClr val="lt1"/>
-      </a:fontRef>
-    </dgm:style>
-  </dgm:styleLbl>
-  <dgm:styleLbl name="fgImgPlace1">
-    <dgm:scene3d>
-      <a:camera prst="orthographicFront"/>
-      <a:lightRig rig="threePt" dir="t"/>
-    </dgm:scene3d>
-    <dgm:sp3d/>
-    <dgm:txPr/>
-    <dgm:style>
-      <a:lnRef idx="2">
-        <a:scrgbClr r="0" g="0" b="0"/>
-      </a:lnRef>
-      <a:fillRef idx="1">
-        <a:scrgbClr r="0" g="0" b="0"/>
-      </a:fillRef>
-      <a:effectRef idx="0">
-        <a:scrgbClr r="0" g="0" b="0"/>
-      </a:effectRef>
-      <a:fontRef idx="minor"/>
-    </dgm:style>
-  </dgm:styleLbl>
-  <dgm:styleLbl name="alignImgPlace1">
-    <dgm:scene3d>
-      <a:camera prst="orthographicFront"/>
-      <a:lightRig rig="threePt" dir="t"/>
-    </dgm:scene3d>
-    <dgm:sp3d/>
-    <dgm:txPr/>
-    <dgm:style>
-      <a:lnRef idx="2">
-        <a:scrgbClr r="0" g="0" b="0"/>
-      </a:lnRef>
-      <a:fillRef idx="1">
-        <a:scrgbClr r="0" g="0" b="0"/>
-      </a:fillRef>
-      <a:effectRef idx="0">
-        <a:scrgbClr r="0" g="0" b="0"/>
-      </a:effectRef>
-      <a:fontRef idx="minor"/>
-    </dgm:style>
-  </dgm:styleLbl>
-  <dgm:styleLbl name="bgImgPlace1">
-    <dgm:scene3d>
-      <a:camera prst="orthographicFront"/>
-      <a:lightRig rig="threePt" dir="t"/>
-    </dgm:scene3d>
-    <dgm:sp3d/>
-    <dgm:txPr/>
-    <dgm:style>
-      <a:lnRef idx="2">
-        <a:scrgbClr r="0" g="0" b="0"/>
-      </a:lnRef>
-      <a:fillRef idx="1">
-        <a:scrgbClr r="0" g="0" b="0"/>
-      </a:fillRef>
-      <a:effectRef idx="0">
-        <a:scrgbClr r="0" g="0" b="0"/>
-      </a:effectRef>
-      <a:fontRef idx="minor"/>
-    </dgm:style>
-  </dgm:styleLbl>
-  <dgm:styleLbl name="sibTrans2D1">
-    <dgm:scene3d>
-      <a:camera prst="orthographicFront"/>
-      <a:lightRig rig="threePt" dir="t"/>
-    </dgm:scene3d>
-    <dgm:sp3d/>
-    <dgm:txPr/>
-    <dgm:style>
-      <a:lnRef idx="0">
-        <a:scrgbClr r="0" g="0" b="0"/>
-      </a:lnRef>
-      <a:fillRef idx="1">
-        <a:scrgbClr r="0" g="0" b="0"/>
-      </a:fillRef>
-      <a:effectRef idx="0">
-        <a:scrgbClr r="0" g="0" b="0"/>
-      </a:effectRef>
-      <a:fontRef idx="minor">
-        <a:schemeClr val="lt1"/>
-      </a:fontRef>
-    </dgm:style>
-  </dgm:styleLbl>
-  <dgm:styleLbl name="fgSibTrans2D1">
-    <dgm:scene3d>
-      <a:camera prst="orthographicFront"/>
-      <a:lightRig rig="threePt" dir="t"/>
-    </dgm:scene3d>
-    <dgm:sp3d/>
-    <dgm:txPr/>
-    <dgm:style>
-      <a:lnRef idx="0">
-        <a:scrgbClr r="0" g="0" b="0"/>
-      </a:lnRef>
-      <a:fillRef idx="1">
-        <a:scrgbClr r="0" g="0" b="0"/>
-      </a:fillRef>
-      <a:effectRef idx="0">
-        <a:scrgbClr r="0" g="0" b="0"/>
-      </a:effectRef>
-      <a:fontRef idx="minor">
-        <a:schemeClr val="lt1"/>
-      </a:fontRef>
-    </dgm:style>
-  </dgm:styleLbl>
-  <dgm:styleLbl name="bgSibTrans2D1">
-    <dgm:scene3d>
-      <a:camera prst="orthographicFront"/>
-      <a:lightRig rig="threePt" dir="t"/>
-    </dgm:scene3d>
-    <dgm:sp3d/>
-    <dgm:txPr/>
-    <dgm:style>
-      <a:lnRef idx="0">
-        <a:scrgbClr r="0" g="0" b="0"/>
-      </a:lnRef>
-      <a:fillRef idx="1">
-        <a:scrgbClr r="0" g="0" b="0"/>
-      </a:fillRef>
-      <a:effectRef idx="0">
-        <a:scrgbClr r="0" g="0" b="0"/>
-      </a:effectRef>
-      <a:fontRef idx="minor">
-        <a:schemeClr val="lt1"/>
-      </a:fontRef>
-    </dgm:style>
-  </dgm:styleLbl>
-  <dgm:styleLbl name="sibTrans1D1">
-    <dgm:scene3d>
-      <a:camera prst="orthographicFront"/>
-      <a:lightRig rig="threePt" dir="t"/>
-    </dgm:scene3d>
-    <dgm:sp3d/>
-    <dgm:txPr/>
-    <dgm:style>
-      <a:lnRef idx="1">
-        <a:scrgbClr r="0" g="0" b="0"/>
-      </a:lnRef>
-      <a:fillRef idx="0">
-        <a:scrgbClr r="0" g="0" b="0"/>
-      </a:fillRef>
-      <a:effectRef idx="0">
-        <a:scrgbClr r="0" g="0" b="0"/>
-      </a:effectRef>
-      <a:fontRef idx="minor"/>
-    </dgm:style>
-  </dgm:styleLbl>
-  <dgm:styleLbl name="callout">
-    <dgm:scene3d>
-      <a:camera prst="orthographicFront"/>
-      <a:lightRig rig="threePt" dir="t"/>
-    </dgm:scene3d>
-    <dgm:sp3d/>
-    <dgm:txPr/>
-    <dgm:style>
-      <a:lnRef idx="2">
-        <a:scrgbClr r="0" g="0" b="0"/>
-      </a:lnRef>
-      <a:fillRef idx="1">
-        <a:scrgbClr r="0" g="0" b="0"/>
-      </a:fillRef>
-      <a:effectRef idx="0">
-        <a:scrgbClr r="0" g="0" b="0"/>
-      </a:effectRef>
-      <a:fontRef idx="minor"/>
-    </dgm:style>
-  </dgm:styleLbl>
-  <dgm:styleLbl name="asst0">
-    <dgm:scene3d>
-      <a:camera prst="orthographicFront"/>
-      <a:lightRig rig="threePt" dir="t"/>
-    </dgm:scene3d>
-    <dgm:sp3d/>
-    <dgm:txPr/>
-    <dgm:style>
-      <a:lnRef idx="2">
-        <a:scrgbClr r="0" g="0" b="0"/>
-      </a:lnRef>
-      <a:fillRef idx="1">
-        <a:scrgbClr r="0" g="0" b="0"/>
-      </a:fillRef>
-      <a:effectRef idx="0">
-        <a:scrgbClr r="0" g="0" b="0"/>
-      </a:effectRef>
-      <a:fontRef idx="minor">
-        <a:schemeClr val="lt1"/>
-      </a:fontRef>
-    </dgm:style>
-  </dgm:styleLbl>
-  <dgm:styleLbl name="asst1">
-    <dgm:scene3d>
-      <a:camera prst="orthographicFront"/>
-      <a:lightRig rig="threePt" dir="t"/>
-    </dgm:scene3d>
-    <dgm:sp3d/>
-    <dgm:txPr/>
-    <dgm:style>
-      <a:lnRef idx="2">
-        <a:scrgbClr r="0" g="0" b="0"/>
-      </a:lnRef>
-      <a:fillRef idx="1">
-        <a:scrgbClr r="0" g="0" b="0"/>
-      </a:fillRef>
-      <a:effectRef idx="0">
-        <a:scrgbClr r="0" g="0" b="0"/>
-      </a:effectRef>
-      <a:fontRef idx="minor">
-        <a:schemeClr val="lt1"/>
-      </a:fontRef>
-    </dgm:style>
-  </dgm:styleLbl>
-  <dgm:styleLbl name="asst2">
-    <dgm:scene3d>
-      <a:camera prst="orthographicFront"/>
-      <a:lightRig rig="threePt" dir="t"/>
-    </dgm:scene3d>
-    <dgm:sp3d/>
-    <dgm:txPr/>
-    <dgm:style>
-      <a:lnRef idx="2">
-        <a:scrgbClr r="0" g="0" b="0"/>
-      </a:lnRef>
-      <a:fillRef idx="1">
-        <a:scrgbClr r="0" g="0" b="0"/>
-      </a:fillRef>
-      <a:effectRef idx="0">
-        <a:scrgbClr r="0" g="0" b="0"/>
-      </a:effectRef>
-      <a:fontRef idx="minor">
-        <a:schemeClr val="lt1"/>
-      </a:fontRef>
-    </dgm:style>
-  </dgm:styleLbl>
-  <dgm:styleLbl name="asst3">
-    <dgm:scene3d>
-      <a:camera prst="orthographicFront"/>
-      <a:lightRig rig="threePt" dir="t"/>
-    </dgm:scene3d>
-    <dgm:sp3d/>
-    <dgm:txPr/>
-    <dgm:style>
-      <a:lnRef idx="2">
-        <a:scrgbClr r="0" g="0" b="0"/>
-      </a:lnRef>
-      <a:fillRef idx="1">
-        <a:scrgbClr r="0" g="0" b="0"/>
-      </a:fillRef>
-      <a:effectRef idx="0">
-        <a:scrgbClr r="0" g="0" b="0"/>
-      </a:effectRef>
-      <a:fontRef idx="minor">
-        <a:schemeClr val="lt1"/>
-      </a:fontRef>
-    </dgm:style>
-  </dgm:styleLbl>
-  <dgm:styleLbl name="asst4">
-    <dgm:scene3d>
-      <a:camera prst="orthographicFront"/>
-      <a:lightRig rig="threePt" dir="t"/>
-    </dgm:scene3d>
-    <dgm:sp3d/>
-    <dgm:txPr/>
-    <dgm:style>
-      <a:lnRef idx="2">
-        <a:scrgbClr r="0" g="0" b="0"/>
-      </a:lnRef>
-      <a:fillRef idx="1">
-        <a:scrgbClr r="0" g="0" b="0"/>
-      </a:fillRef>
-      <a:effectRef idx="0">
-        <a:scrgbClr r="0" g="0" b="0"/>
-      </a:effectRef>
-      <a:fontRef idx="minor">
-        <a:schemeClr val="lt1"/>
-      </a:fontRef>
-    </dgm:style>
-  </dgm:styleLbl>
-  <dgm:styleLbl name="parChTrans2D1">
-    <dgm:scene3d>
-      <a:camera prst="orthographicFront"/>
-      <a:lightRig rig="threePt" dir="t"/>
-    </dgm:scene3d>
-    <dgm:sp3d/>
-    <dgm:txPr/>
-    <dgm:style>
-      <a:lnRef idx="2">
-        <a:scrgbClr r="0" g="0" b="0"/>
-      </a:lnRef>
-      <a:fillRef idx="1">
-        <a:scrgbClr r="0" g="0" b="0"/>
-      </a:fillRef>
-      <a:effectRef idx="0">
-        <a:scrgbClr r="0" g="0" b="0"/>
-      </a:effectRef>
-      <a:fontRef idx="minor">
-        <a:schemeClr val="lt1"/>
-      </a:fontRef>
-    </dgm:style>
-  </dgm:styleLbl>
-  <dgm:styleLbl name="parChTrans2D2">
-    <dgm:scene3d>
-      <a:camera prst="orthographicFront"/>
-      <a:lightRig rig="threePt" dir="t"/>
-    </dgm:scene3d>
-    <dgm:sp3d/>
-    <dgm:txPr/>
-    <dgm:style>
-      <a:lnRef idx="2">
-        <a:scrgbClr r="0" g="0" b="0"/>
-      </a:lnRef>
-      <a:fillRef idx="1">
-        <a:scrgbClr r="0" g="0" b="0"/>
-      </a:fillRef>
-      <a:effectRef idx="0">
-        <a:scrgbClr r="0" g="0" b="0"/>
-      </a:effectRef>
-      <a:fontRef idx="minor">
-        <a:schemeClr val="lt1"/>
-      </a:fontRef>
-    </dgm:style>
-  </dgm:styleLbl>
-  <dgm:styleLbl name="parChTrans2D3">
-    <dgm:scene3d>
-      <a:camera prst="orthographicFront"/>
-      <a:lightRig rig="threePt" dir="t"/>
-    </dgm:scene3d>
-    <dgm:sp3d/>
-    <dgm:txPr/>
-    <dgm:style>
-      <a:lnRef idx="2">
-        <a:scrgbClr r="0" g="0" b="0"/>
-      </a:lnRef>
-      <a:fillRef idx="1">
-        <a:scrgbClr r="0" g="0" b="0"/>
-      </a:fillRef>
-      <a:effectRef idx="0">
-        <a:scrgbClr r="0" g="0" b="0"/>
-      </a:effectRef>
-      <a:fontRef idx="minor">
-        <a:schemeClr val="lt1"/>
-      </a:fontRef>
-    </dgm:style>
-  </dgm:styleLbl>
-  <dgm:styleLbl name="parChTrans2D4">
-    <dgm:scene3d>
-      <a:camera prst="orthographicFront"/>
-      <a:lightRig rig="threePt" dir="t"/>
-    </dgm:scene3d>
-    <dgm:sp3d/>
-    <dgm:txPr/>
-    <dgm:style>
-      <a:lnRef idx="2">
-        <a:scrgbClr r="0" g="0" b="0"/>
-      </a:lnRef>
-      <a:fillRef idx="1">
-        <a:scrgbClr r="0" g="0" b="0"/>
-      </a:fillRef>
-      <a:effectRef idx="0">
-        <a:scrgbClr r="0" g="0" b="0"/>
-      </a:effectRef>
-      <a:fontRef idx="minor">
-        <a:schemeClr val="lt1"/>
-      </a:fontRef>
-    </dgm:style>
-  </dgm:styleLbl>
-  <dgm:styleLbl name="parChTrans1D1">
-    <dgm:scene3d>
-      <a:camera prst="orthographicFront"/>
-      <a:lightRig rig="threePt" dir="t"/>
-    </dgm:scene3d>
-    <dgm:sp3d/>
-    <dgm:txPr/>
-    <dgm:style>
-      <a:lnRef idx="2">
-        <a:scrgbClr r="0" g="0" b="0"/>
-      </a:lnRef>
-      <a:fillRef idx="0">
-        <a:scrgbClr r="0" g="0" b="0"/>
-      </a:fillRef>
-      <a:effectRef idx="0">
-        <a:scrgbClr r="0" g="0" b="0"/>
-      </a:effectRef>
-      <a:fontRef idx="minor"/>
-    </dgm:style>
-  </dgm:styleLbl>
-  <dgm:styleLbl name="parChTrans1D2">
-    <dgm:scene3d>
-      <a:camera prst="orthographicFront"/>
-      <a:lightRig rig="threePt" dir="t"/>
-    </dgm:scene3d>
-    <dgm:sp3d/>
-    <dgm:txPr/>
-    <dgm:style>
-      <a:lnRef idx="2">
-        <a:scrgbClr r="0" g="0" b="0"/>
-      </a:lnRef>
-      <a:fillRef idx="0">
-        <a:scrgbClr r="0" g="0" b="0"/>
-      </a:fillRef>
-      <a:effectRef idx="0">
-        <a:scrgbClr r="0" g="0" b="0"/>
-      </a:effectRef>
-      <a:fontRef idx="minor"/>
-    </dgm:style>
-  </dgm:styleLbl>
-  <dgm:styleLbl name="parChTrans1D3">
-    <dgm:scene3d>
-      <a:camera prst="orthographicFront"/>
-      <a:lightRig rig="threePt" dir="t"/>
-    </dgm:scene3d>
-    <dgm:sp3d/>
-    <dgm:txPr/>
-    <dgm:style>
-      <a:lnRef idx="2">
-        <a:scrgbClr r="0" g="0" b="0"/>
-      </a:lnRef>
-      <a:fillRef idx="0">
-        <a:scrgbClr r="0" g="0" b="0"/>
-      </a:fillRef>
-      <a:effectRef idx="0">
-        <a:scrgbClr r="0" g="0" b="0"/>
-      </a:effectRef>
-      <a:fontRef idx="minor"/>
-    </dgm:style>
-  </dgm:styleLbl>
-  <dgm:styleLbl name="parChTrans1D4">
-    <dgm:scene3d>
-      <a:camera prst="orthographicFront"/>
-      <a:lightRig rig="threePt" dir="t"/>
-    </dgm:scene3d>
-    <dgm:sp3d/>
-    <dgm:txPr/>
-    <dgm:style>
-      <a:lnRef idx="2">
-        <a:scrgbClr r="0" g="0" b="0"/>
-      </a:lnRef>
-      <a:fillRef idx="0">
-        <a:scrgbClr r="0" g="0" b="0"/>
-      </a:fillRef>
-      <a:effectRef idx="0">
-        <a:scrgbClr r="0" g="0" b="0"/>
-      </a:effectRef>
-      <a:fontRef idx="minor"/>
-    </dgm:style>
-  </dgm:styleLbl>
-  <dgm:styleLbl name="fgAcc1">
-    <dgm:scene3d>
-      <a:camera prst="orthographicFront"/>
-      <a:lightRig rig="threePt" dir="t"/>
-    </dgm:scene3d>
-    <dgm:sp3d/>
-    <dgm:txPr/>
-    <dgm:style>
-      <a:lnRef idx="2">
-        <a:scrgbClr r="0" g="0" b="0"/>
-      </a:lnRef>
-      <a:fillRef idx="1">
-        <a:scrgbClr r="0" g="0" b="0"/>
-      </a:fillRef>
-      <a:effectRef idx="0">
-        <a:scrgbClr r="0" g="0" b="0"/>
-      </a:effectRef>
-      <a:fontRef idx="minor"/>
-    </dgm:style>
-  </dgm:styleLbl>
-  <dgm:styleLbl name="conFgAcc1">
-    <dgm:scene3d>
-      <a:camera prst="orthographicFront"/>
-      <a:lightRig rig="threePt" dir="t"/>
-    </dgm:scene3d>
-    <dgm:sp3d/>
-    <dgm:txPr/>
-    <dgm:style>
-      <a:lnRef idx="2">
-        <a:scrgbClr r="0" g="0" b="0"/>
-      </a:lnRef>
-      <a:fillRef idx="1">
-        <a:scrgbClr r="0" g="0" b="0"/>
-      </a:fillRef>
-      <a:effectRef idx="0">
-        <a:scrgbClr r="0" g="0" b="0"/>
-      </a:effectRef>
-      <a:fontRef idx="minor"/>
-    </dgm:style>
-  </dgm:styleLbl>
-  <dgm:styleLbl name="alignAcc1">
-    <dgm:scene3d>
-      <a:camera prst="orthographicFront"/>
-      <a:lightRig rig="threePt" dir="t"/>
-    </dgm:scene3d>
-    <dgm:sp3d/>
-    <dgm:txPr/>
-    <dgm:style>
-      <a:lnRef idx="2">
-        <a:scrgbClr r="0" g="0" b="0"/>
-      </a:lnRef>
-      <a:fillRef idx="1">
-        <a:scrgbClr r="0" g="0" b="0"/>
-      </a:fillRef>
-      <a:effectRef idx="0">
-        <a:scrgbClr r="0" g="0" b="0"/>
-      </a:effectRef>
-      <a:fontRef idx="minor"/>
-    </dgm:style>
-  </dgm:styleLbl>
-  <dgm:styleLbl name="trAlignAcc1">
-    <dgm:scene3d>
-      <a:camera prst="orthographicFront"/>
-      <a:lightRig rig="threePt" dir="t"/>
-    </dgm:scene3d>
-    <dgm:sp3d/>
-    <dgm:txPr/>
-    <dgm:style>
-      <a:lnRef idx="1">
-        <a:scrgbClr r="0" g="0" b="0"/>
-      </a:lnRef>
-      <a:fillRef idx="1">
-        <a:scrgbClr r="0" g="0" b="0"/>
-      </a:fillRef>
-      <a:effectRef idx="0">
-        <a:scrgbClr r="0" g="0" b="0"/>
-      </a:effectRef>
-      <a:fontRef idx="minor"/>
-    </dgm:style>
-  </dgm:styleLbl>
-  <dgm:styleLbl name="bgAcc1">
-    <dgm:scene3d>
-      <a:camera prst="orthographicFront"/>
-      <a:lightRig rig="threePt" dir="t"/>
-    </dgm:scene3d>
-    <dgm:sp3d/>
-    <dgm:txPr/>
-    <dgm:style>
-      <a:lnRef idx="2">
-        <a:scrgbClr r="0" g="0" b="0"/>
-      </a:lnRef>
-      <a:fillRef idx="1">
-        <a:scrgbClr r="0" g="0" b="0"/>
-      </a:fillRef>
-      <a:effectRef idx="0">
-        <a:scrgbClr r="0" g="0" b="0"/>
-      </a:effectRef>
-      <a:fontRef idx="minor"/>
-    </dgm:style>
-  </dgm:styleLbl>
-  <dgm:styleLbl name="solidFgAcc1">
-    <dgm:scene3d>
-      <a:camera prst="orthographicFront"/>
-      <a:lightRig rig="threePt" dir="t"/>
-    </dgm:scene3d>
-    <dgm:sp3d/>
-    <dgm:txPr/>
-    <dgm:style>
-      <a:lnRef idx="2">
-        <a:scrgbClr r="0" g="0" b="0"/>
-      </a:lnRef>
-      <a:fillRef idx="1">
-        <a:scrgbClr r="0" g="0" b="0"/>
-      </a:fillRef>
-      <a:effectRef idx="0">
-        <a:scrgbClr r="0" g="0" b="0"/>
-      </a:effectRef>
-      <a:fontRef idx="minor"/>
-    </dgm:style>
-  </dgm:styleLbl>
-  <dgm:styleLbl name="solidAlignAcc1">
-    <dgm:scene3d>
-      <a:camera prst="orthographicFront"/>
-      <a:lightRig rig="threePt" dir="t"/>
-    </dgm:scene3d>
-    <dgm:sp3d/>
-    <dgm:txPr/>
-    <dgm:style>
-      <a:lnRef idx="2">
-        <a:scrgbClr r="0" g="0" b="0"/>
-      </a:lnRef>
-      <a:fillRef idx="1">
-        <a:scrgbClr r="0" g="0" b="0"/>
-      </a:fillRef>
-      <a:effectRef idx="0">
-        <a:scrgbClr r="0" g="0" b="0"/>
-      </a:effectRef>
-      <a:fontRef idx="minor"/>
-    </dgm:style>
-  </dgm:styleLbl>
-  <dgm:styleLbl name="solidBgAcc1">
-    <dgm:scene3d>
-      <a:camera prst="orthographicFront"/>
-      <a:lightRig rig="threePt" dir="t"/>
-    </dgm:scene3d>
-    <dgm:sp3d/>
-    <dgm:txPr/>
-    <dgm:style>
-      <a:lnRef idx="2">
-        <a:scrgbClr r="0" g="0" b="0"/>
-      </a:lnRef>
-      <a:fillRef idx="1">
-        <a:scrgbClr r="0" g="0" b="0"/>
-      </a:fillRef>
-      <a:effectRef idx="0">
-        <a:scrgbClr r="0" g="0" b="0"/>
-      </a:effectRef>
-      <a:fontRef idx="minor"/>
-    </dgm:style>
-  </dgm:styleLbl>
-  <dgm:styleLbl name="fgAccFollowNode1">
-    <dgm:scene3d>
-      <a:camera prst="orthographicFront"/>
-      <a:lightRig rig="threePt" dir="t"/>
-    </dgm:scene3d>
-    <dgm:sp3d/>
-    <dgm:txPr/>
-    <dgm:style>
-      <a:lnRef idx="2">
-        <a:scrgbClr r="0" g="0" b="0"/>
-      </a:lnRef>
-      <a:fillRef idx="1">
-        <a:scrgbClr r="0" g="0" b="0"/>
-      </a:fillRef>
-      <a:effectRef idx="0">
-        <a:scrgbClr r="0" g="0" b="0"/>
-      </a:effectRef>
-      <a:fontRef idx="minor"/>
-    </dgm:style>
-  </dgm:styleLbl>
-  <dgm:styleLbl name="alignAccFollowNode1">
-    <dgm:scene3d>
-      <a:camera prst="orthographicFront"/>
-      <a:lightRig rig="threePt" dir="t"/>
-    </dgm:scene3d>
-    <dgm:sp3d/>
-    <dgm:txPr/>
-    <dgm:style>
-      <a:lnRef idx="2">
-        <a:scrgbClr r="0" g="0" b="0"/>
-      </a:lnRef>
-      <a:fillRef idx="1">
-        <a:scrgbClr r="0" g="0" b="0"/>
-      </a:fillRef>
-      <a:effectRef idx="0">
-        <a:scrgbClr r="0" g="0" b="0"/>
-      </a:effectRef>
-      <a:fontRef idx="minor"/>
-    </dgm:style>
-  </dgm:styleLbl>
-  <dgm:styleLbl name="bgAccFollowNode1">
-    <dgm:scene3d>
-      <a:camera prst="orthographicFront"/>
-      <a:lightRig rig="threePt" dir="t"/>
-    </dgm:scene3d>
-    <dgm:sp3d/>
-    <dgm:txPr/>
-    <dgm:style>
-      <a:lnRef idx="2">
-        <a:scrgbClr r="0" g="0" b="0"/>
-      </a:lnRef>
-      <a:fillRef idx="1">
-        <a:scrgbClr r="0" g="0" b="0"/>
-      </a:fillRef>
-      <a:effectRef idx="0">
-        <a:scrgbClr r="0" g="0" b="0"/>
-      </a:effectRef>
-      <a:fontRef idx="minor"/>
-    </dgm:style>
-  </dgm:styleLbl>
-  <dgm:styleLbl name="fgAcc0">
-    <dgm:scene3d>
-      <a:camera prst="orthographicFront"/>
-      <a:lightRig rig="threePt" dir="t"/>
-    </dgm:scene3d>
-    <dgm:sp3d/>
-    <dgm:txPr/>
-    <dgm:style>
-      <a:lnRef idx="2">
-        <a:scrgbClr r="0" g="0" b="0"/>
-      </a:lnRef>
-      <a:fillRef idx="1">
-        <a:scrgbClr r="0" g="0" b="0"/>
-      </a:fillRef>
-      <a:effectRef idx="0">
-        <a:scrgbClr r="0" g="0" b="0"/>
-      </a:effectRef>
-      <a:fontRef idx="minor"/>
-    </dgm:style>
-  </dgm:styleLbl>
-  <dgm:styleLbl name="fgAcc2">
-    <dgm:scene3d>
-      <a:camera prst="orthographicFront"/>
-      <a:lightRig rig="threePt" dir="t"/>
-    </dgm:scene3d>
-    <dgm:sp3d/>
-    <dgm:txPr/>
-    <dgm:style>
-      <a:lnRef idx="2">
-        <a:scrgbClr r="0" g="0" b="0"/>
-      </a:lnRef>
-      <a:fillRef idx="1">
-        <a:scrgbClr r="0" g="0" b="0"/>
-      </a:fillRef>
-      <a:effectRef idx="0">
-        <a:scrgbClr r="0" g="0" b="0"/>
-      </a:effectRef>
-      <a:fontRef idx="minor"/>
-    </dgm:style>
-  </dgm:styleLbl>
-  <dgm:styleLbl name="fgAcc3">
-    <dgm:scene3d>
-      <a:camera prst="orthographicFront"/>
-      <a:lightRig rig="threePt" dir="t"/>
-    </dgm:scene3d>
-    <dgm:sp3d/>
-    <dgm:txPr/>
-    <dgm:style>
-      <a:lnRef idx="2">
-        <a:scrgbClr r="0" g="0" b="0"/>
-      </a:lnRef>
-      <a:fillRef idx="1">
-        <a:scrgbClr r="0" g="0" b="0"/>
-      </a:fillRef>
-      <a:effectRef idx="0">
-        <a:scrgbClr r="0" g="0" b="0"/>
-      </a:effectRef>
-      <a:fontRef idx="minor"/>
-    </dgm:style>
-  </dgm:styleLbl>
-  <dgm:styleLbl name="fgAcc4">
-    <dgm:scene3d>
-      <a:camera prst="orthographicFront"/>
-      <a:lightRig rig="threePt" dir="t"/>
-    </dgm:scene3d>
-    <dgm:sp3d/>
-    <dgm:txPr/>
-    <dgm:style>
-      <a:lnRef idx="2">
-        <a:scrgbClr r="0" g="0" b="0"/>
-      </a:lnRef>
-      <a:fillRef idx="1">
-        <a:scrgbClr r="0" g="0" b="0"/>
-      </a:fillRef>
-      <a:effectRef idx="0">
-        <a:scrgbClr r="0" g="0" b="0"/>
-      </a:effectRef>
-      <a:fontRef idx="minor"/>
-    </dgm:style>
-  </dgm:styleLbl>
-  <dgm:styleLbl name="bgShp">
-    <dgm:scene3d>
-      <a:camera prst="orthographicFront"/>
-      <a:lightRig rig="threePt" dir="t"/>
-    </dgm:scene3d>
-    <dgm:sp3d/>
-    <dgm:txPr/>
-    <dgm:style>
-      <a:lnRef idx="0">
-        <a:scrgbClr r="0" g="0" b="0"/>
-      </a:lnRef>
-      <a:fillRef idx="1">
-        <a:scrgbClr r="0" g="0" b="0"/>
-      </a:fillRef>
-      <a:effectRef idx="0">
-        <a:scrgbClr r="0" g="0" b="0"/>
-      </a:effectRef>
-      <a:fontRef idx="minor"/>
-    </dgm:style>
-  </dgm:styleLbl>
-  <dgm:styleLbl name="dkBgShp">
-    <dgm:scene3d>
-      <a:camera prst="orthographicFront"/>
-      <a:lightRig rig="threePt" dir="t"/>
-    </dgm:scene3d>
-    <dgm:sp3d/>
-    <dgm:txPr/>
-    <dgm:style>
-      <a:lnRef idx="0">
-        <a:scrgbClr r="0" g="0" b="0"/>
-      </a:lnRef>
-      <a:fillRef idx="1">
-        <a:scrgbClr r="0" g="0" b="0"/>
-      </a:fillRef>
-      <a:effectRef idx="0">
-        <a:scrgbClr r="0" g="0" b="0"/>
-      </a:effectRef>
-      <a:fontRef idx="minor"/>
-    </dgm:style>
-  </dgm:styleLbl>
-  <dgm:styleLbl name="trBgShp">
-    <dgm:scene3d>
-      <a:camera prst="orthographicFront"/>
-      <a:lightRig rig="threePt" dir="t"/>
-    </dgm:scene3d>
-    <dgm:sp3d/>
-    <dgm:txPr/>
-    <dgm:style>
-      <a:lnRef idx="0">
-        <a:scrgbClr r="0" g="0" b="0"/>
-      </a:lnRef>
-      <a:fillRef idx="1">
-        <a:scrgbClr r="0" g="0" b="0"/>
-      </a:fillRef>
-      <a:effectRef idx="0">
-        <a:scrgbClr r="0" g="0" b="0"/>
-      </a:effectRef>
-      <a:fontRef idx="minor"/>
-    </dgm:style>
-  </dgm:styleLbl>
-  <dgm:styleLbl name="fgShp">
-    <dgm:scene3d>
-      <a:camera prst="orthographicFront"/>
-      <a:lightRig rig="threePt" dir="t"/>
-    </dgm:scene3d>
-    <dgm:sp3d/>
-    <dgm:txPr/>
-    <dgm:style>
-      <a:lnRef idx="2">
-        <a:scrgbClr r="0" g="0" b="0"/>
-      </a:lnRef>
-      <a:fillRef idx="1">
-        <a:scrgbClr r="0" g="0" b="0"/>
-      </a:fillRef>
-      <a:effectRef idx="0">
-        <a:scrgbClr r="0" g="0" b="0"/>
-      </a:effectRef>
-      <a:fontRef idx="minor"/>
-    </dgm:style>
-  </dgm:styleLbl>
-  <dgm:styleLbl name="revTx">
-    <dgm:scene3d>
-      <a:camera prst="orthographicFront"/>
-      <a:lightRig rig="threePt" dir="t"/>
-    </dgm:scene3d>
-    <dgm:sp3d/>
-    <dgm:txPr/>
-    <dgm:style>
-      <a:lnRef idx="0">
-        <a:scrgbClr r="0" g="0" b="0"/>
-      </a:lnRef>
-      <a:fillRef idx="0">
-        <a:scrgbClr r="0" g="0" b="0"/>
-      </a:fillRef>
-      <a:effectRef idx="0">
-        <a:scrgbClr r="0" g="0" b="0"/>
-      </a:effectRef>
-      <a:fontRef idx="minor"/>
-    </dgm:style>
-  </dgm:styleLbl>
-</dgm:styleDef>
-</file>
-
 <file path=ppt/slideLayouts/slideLayout1.xml><?xml version="1.0" encoding="utf-8"?>
 <p:sldLayout xmlns:a="http://schemas.openxmlformats.org/drawingml/2006/main" xmlns:r="http://schemas.openxmlformats.org/officeDocument/2006/relationships" xmlns:p="http://schemas.openxmlformats.org/presentationml/2006/main" type="title" preserve="1">
   <p:cSld name="Title Slide">
@@ -5777,7 +3351,7 @@
           <a:p>
             <a:fld id="{6A4B53A7-3209-46A6-9454-F38EAC8F11E7}" type="datetimeFigureOut">
               <a:rPr lang="en-US" smtClean="0"/>
-              <a:t>2022-03-24</a:t>
+              <a:t>2022-03-28</a:t>
             </a:fld>
             <a:endParaRPr lang="en-US"/>
           </a:p>
@@ -6028,7 +3602,7 @@
           <a:p>
             <a:fld id="{6A4B53A7-3209-46A6-9454-F38EAC8F11E7}" type="datetimeFigureOut">
               <a:rPr lang="en-US" smtClean="0"/>
-              <a:t>2022-03-24</a:t>
+              <a:t>2022-03-28</a:t>
             </a:fld>
             <a:endParaRPr lang="en-US"/>
           </a:p>
@@ -6289,7 +3863,7 @@
           <a:p>
             <a:fld id="{6A4B53A7-3209-46A6-9454-F38EAC8F11E7}" type="datetimeFigureOut">
               <a:rPr lang="en-US" smtClean="0"/>
-              <a:t>2022-03-24</a:t>
+              <a:t>2022-03-28</a:t>
             </a:fld>
             <a:endParaRPr lang="en-US"/>
           </a:p>
@@ -6540,7 +4114,7 @@
           <a:p>
             <a:fld id="{6A4B53A7-3209-46A6-9454-F38EAC8F11E7}" type="datetimeFigureOut">
               <a:rPr lang="en-US" smtClean="0"/>
-              <a:t>2022-03-24</a:t>
+              <a:t>2022-03-28</a:t>
             </a:fld>
             <a:endParaRPr lang="en-US"/>
           </a:p>
@@ -6868,7 +4442,7 @@
           <a:p>
             <a:fld id="{6A4B53A7-3209-46A6-9454-F38EAC8F11E7}" type="datetimeFigureOut">
               <a:rPr lang="en-US" smtClean="0"/>
-              <a:t>2022-03-24</a:t>
+              <a:t>2022-03-28</a:t>
             </a:fld>
             <a:endParaRPr lang="en-US"/>
           </a:p>
@@ -7186,7 +4760,7 @@
           <a:p>
             <a:fld id="{6A4B53A7-3209-46A6-9454-F38EAC8F11E7}" type="datetimeFigureOut">
               <a:rPr lang="en-US" smtClean="0"/>
-              <a:t>2022-03-24</a:t>
+              <a:t>2022-03-28</a:t>
             </a:fld>
             <a:endParaRPr lang="en-US"/>
           </a:p>
@@ -7651,7 +5225,7 @@
           <a:p>
             <a:fld id="{6A4B53A7-3209-46A6-9454-F38EAC8F11E7}" type="datetimeFigureOut">
               <a:rPr lang="en-US" smtClean="0"/>
-              <a:t>2022-03-24</a:t>
+              <a:t>2022-03-28</a:t>
             </a:fld>
             <a:endParaRPr lang="en-US"/>
           </a:p>
@@ -7845,7 +5419,7 @@
           <a:p>
             <a:fld id="{6A4B53A7-3209-46A6-9454-F38EAC8F11E7}" type="datetimeFigureOut">
               <a:rPr lang="en-US" smtClean="0"/>
-              <a:t>2022-03-24</a:t>
+              <a:t>2022-03-28</a:t>
             </a:fld>
             <a:endParaRPr lang="en-US"/>
           </a:p>
@@ -8011,7 +5585,7 @@
           <a:p>
             <a:fld id="{6A4B53A7-3209-46A6-9454-F38EAC8F11E7}" type="datetimeFigureOut">
               <a:rPr lang="en-US" smtClean="0"/>
-              <a:t>2022-03-24</a:t>
+              <a:t>2022-03-28</a:t>
             </a:fld>
             <a:endParaRPr lang="en-US"/>
           </a:p>
@@ -8375,7 +5949,7 @@
           <a:p>
             <a:fld id="{6A4B53A7-3209-46A6-9454-F38EAC8F11E7}" type="datetimeFigureOut">
               <a:rPr lang="en-US" smtClean="0"/>
-              <a:t>2022-03-24</a:t>
+              <a:t>2022-03-28</a:t>
             </a:fld>
             <a:endParaRPr lang="en-US"/>
           </a:p>
@@ -8719,7 +6293,7 @@
           <a:p>
             <a:fld id="{6A4B53A7-3209-46A6-9454-F38EAC8F11E7}" type="datetimeFigureOut">
               <a:rPr lang="en-US" smtClean="0"/>
-              <a:t>2022-03-24</a:t>
+              <a:t>2022-03-28</a:t>
             </a:fld>
             <a:endParaRPr lang="en-US"/>
           </a:p>
@@ -9014,7 +6588,7 @@
             <a:fld id="{6A4B53A7-3209-46A6-9454-F38EAC8F11E7}" type="datetimeFigureOut">
               <a:rPr lang="en-US" smtClean="0"/>
               <a:pPr/>
-              <a:t>2022-03-24</a:t>
+              <a:t>2022-03-28</a:t>
             </a:fld>
             <a:endParaRPr lang="en-US" dirty="0"/>
           </a:p>
@@ -9678,23 +7252,45 @@
         </p:nvSpPr>
         <p:spPr>
           <a:xfrm>
-            <a:off x="838199" y="381934"/>
-            <a:ext cx="5257801" cy="5181523"/>
+            <a:off x="838198" y="381934"/>
+            <a:ext cx="5552639" cy="5181523"/>
           </a:xfrm>
         </p:spPr>
         <p:txBody>
           <a:bodyPr anchor="b">
-            <a:normAutofit/>
+            <a:normAutofit fontScale="90000"/>
           </a:bodyPr>
           <a:lstStyle/>
           <a:p>
             <a:r>
-              <a:rPr lang="en-US" sz="6700">
+              <a:rPr lang="en-US" sz="6700" dirty="0">
                 <a:solidFill>
                   <a:srgbClr val="FFFFFF"/>
                 </a:solidFill>
               </a:rPr>
-              <a:t>The Social Dilemma – Social Media &amp; Your Mental Health</a:t>
+              <a:t>One of the Factor of Suicide Rates – </a:t>
+            </a:r>
+            <a:br>
+              <a:rPr lang="en-US" sz="6700" dirty="0">
+                <a:solidFill>
+                  <a:srgbClr val="FFFFFF"/>
+                </a:solidFill>
+              </a:rPr>
+            </a:br>
+            <a:br>
+              <a:rPr lang="en-US" sz="6700" dirty="0">
+                <a:solidFill>
+                  <a:srgbClr val="FFFFFF"/>
+                </a:solidFill>
+              </a:rPr>
+            </a:br>
+            <a:r>
+              <a:rPr lang="en-US" sz="6700" dirty="0">
+                <a:solidFill>
+                  <a:srgbClr val="FFFFFF"/>
+                </a:solidFill>
+              </a:rPr>
+              <a:t>Social Media Usage </a:t>
             </a:r>
           </a:p>
         </p:txBody>
@@ -10347,7 +7943,7 @@
               <a:buNone/>
             </a:pPr>
             <a:r>
-              <a:rPr lang="en-US" sz="1800">
+              <a:rPr lang="en-US" sz="1800" dirty="0">
                 <a:solidFill>
                   <a:srgbClr val="FFFFFF"/>
                 </a:solidFill>
@@ -10359,7 +7955,7 @@
             <a:pPr marL="0" indent="0">
               <a:buNone/>
             </a:pPr>
-            <a:endParaRPr lang="en-US" sz="1800">
+            <a:endParaRPr lang="en-US" sz="1800" dirty="0">
               <a:solidFill>
                 <a:srgbClr val="FFFFFF"/>
               </a:solidFill>
@@ -10367,7 +7963,7 @@
           </a:p>
           <a:p>
             <a:r>
-              <a:rPr lang="en-US" sz="1800">
+              <a:rPr lang="en-US" sz="1800" dirty="0">
                 <a:solidFill>
                   <a:srgbClr val="FFFFFF"/>
                 </a:solidFill>
@@ -10377,17 +7973,30 @@
           </a:p>
           <a:p>
             <a:r>
-              <a:rPr lang="en-US" sz="1800">
+              <a:rPr lang="en-US" sz="1800" dirty="0">
                 <a:solidFill>
                   <a:srgbClr val="FFFFFF"/>
                 </a:solidFill>
               </a:rPr>
-              <a:t>Tina Bellon</a:t>
+              <a:t>Tina </a:t>
             </a:r>
-          </a:p>
-          <a:p>
             <a:r>
-              <a:rPr lang="en-US" sz="1800">
+              <a:rPr lang="en-US" sz="1800" dirty="0" err="1">
+                <a:solidFill>
+                  <a:srgbClr val="FFFFFF"/>
+                </a:solidFill>
+              </a:rPr>
+              <a:t>Bellon</a:t>
+            </a:r>
+            <a:endParaRPr lang="en-US" sz="1800" dirty="0">
+              <a:solidFill>
+                <a:srgbClr val="FFFFFF"/>
+              </a:solidFill>
+            </a:endParaRPr>
+          </a:p>
+          <a:p>
+            <a:r>
+              <a:rPr lang="en-US" sz="1800" dirty="0">
                 <a:solidFill>
                   <a:srgbClr val="FFFFFF"/>
                 </a:solidFill>
@@ -10397,17 +8006,38 @@
           </a:p>
           <a:p>
             <a:r>
-              <a:rPr lang="en-US" sz="1800">
+              <a:rPr lang="en-US" sz="1800" dirty="0" err="1">
                 <a:solidFill>
                   <a:srgbClr val="FFFFFF"/>
                 </a:solidFill>
               </a:rPr>
-              <a:t>Nensi Dobaria</a:t>
+              <a:t>Nensi</a:t>
             </a:r>
-          </a:p>
-          <a:p>
             <a:r>
-              <a:rPr lang="en-US" sz="1800">
+              <a:rPr lang="en-US" sz="1800" dirty="0">
+                <a:solidFill>
+                  <a:srgbClr val="FFFFFF"/>
+                </a:solidFill>
+              </a:rPr>
+              <a:t> </a:t>
+            </a:r>
+            <a:r>
+              <a:rPr lang="en-US" sz="1800" dirty="0" err="1">
+                <a:solidFill>
+                  <a:srgbClr val="FFFFFF"/>
+                </a:solidFill>
+              </a:rPr>
+              <a:t>Dobaria</a:t>
+            </a:r>
+            <a:endParaRPr lang="en-US" sz="1800" dirty="0">
+              <a:solidFill>
+                <a:srgbClr val="FFFFFF"/>
+              </a:solidFill>
+            </a:endParaRPr>
+          </a:p>
+          <a:p>
+            <a:r>
+              <a:rPr lang="en-US" sz="1800" dirty="0">
                 <a:solidFill>
                   <a:srgbClr val="FFFFFF"/>
                 </a:solidFill>
@@ -11170,12 +8800,12 @@
           <a:chExt cx="0" cy="0"/>
         </a:xfrm>
       </p:grpSpPr>
-      <p:sp>
+      <p:sp useBgFill="1">
         <p:nvSpPr>
-          <p:cNvPr id="9" name="Rectangle 8">
+          <p:cNvPr id="52" name="Rectangle 39">
             <a:extLst>
               <a:ext uri="{FF2B5EF4-FFF2-40B4-BE49-F238E27FC236}">
-                <a16:creationId xmlns:a16="http://schemas.microsoft.com/office/drawing/2014/main" id="{383F4F3A-DF89-453C-A499-8C259F6A2F13}"/>
+                <a16:creationId xmlns:a16="http://schemas.microsoft.com/office/drawing/2014/main" id="{7EE0A6B3-EB7E-45AA-ADB6-138489E0CD75}"/>
               </a:ext>
               <a:ext uri="{C183D7F6-B498-43B3-948B-1728B52AA6E4}">
                 <adec:decorative xmlns:adec="http://schemas.microsoft.com/office/drawing/2017/decorative" val="1"/>
@@ -11201,6 +8831,82 @@
           <a:prstGeom prst="rect">
             <a:avLst/>
           </a:prstGeom>
+          <a:ln w="12700" cap="flat" cmpd="sng" algn="ctr">
+            <a:noFill/>
+            <a:prstDash val="solid"/>
+            <a:miter lim="800000"/>
+          </a:ln>
+          <a:effectLst/>
+          <a:extLst>
+            <a:ext uri="{91240B29-F687-4F45-9708-019B960494DF}">
+              <a14:hiddenLine xmlns:a14="http://schemas.microsoft.com/office/drawing/2010/main" w="12700" cap="flat" cmpd="sng" algn="ctr">
+                <a:solidFill>
+                  <a:schemeClr val="accent1">
+                    <a:shade val="50000"/>
+                  </a:schemeClr>
+                </a:solidFill>
+                <a:prstDash val="solid"/>
+                <a:miter lim="800000"/>
+              </a14:hiddenLine>
+            </a:ext>
+          </a:extLst>
+        </p:spPr>
+        <p:style>
+          <a:lnRef idx="2">
+            <a:schemeClr val="accent1">
+              <a:shade val="50000"/>
+            </a:schemeClr>
+          </a:lnRef>
+          <a:fillRef idx="1">
+            <a:schemeClr val="accent1"/>
+          </a:fillRef>
+          <a:effectRef idx="0">
+            <a:schemeClr val="accent1"/>
+          </a:effectRef>
+          <a:fontRef idx="minor">
+            <a:schemeClr val="lt1"/>
+          </a:fontRef>
+        </p:style>
+        <p:txBody>
+          <a:bodyPr rtlCol="0" anchor="ctr"/>
+          <a:lstStyle/>
+          <a:p>
+            <a:pPr algn="ctr"/>
+            <a:endParaRPr lang="en-US"/>
+          </a:p>
+        </p:txBody>
+      </p:sp>
+      <p:sp>
+        <p:nvSpPr>
+          <p:cNvPr id="53" name="!!Rectangle">
+            <a:extLst>
+              <a:ext uri="{FF2B5EF4-FFF2-40B4-BE49-F238E27FC236}">
+                <a16:creationId xmlns:a16="http://schemas.microsoft.com/office/drawing/2014/main" id="{0C0EA1AB-DC8C-4976-9474-9313A673D4E9}"/>
+              </a:ext>
+              <a:ext uri="{C183D7F6-B498-43B3-948B-1728B52AA6E4}">
+                <adec:decorative xmlns:adec="http://schemas.microsoft.com/office/drawing/2017/decorative" val="1"/>
+              </a:ext>
+            </a:extLst>
+          </p:cNvPr>
+          <p:cNvSpPr>
+            <a:spLocks noGrp="1" noRot="1" noChangeAspect="1" noMove="1" noResize="1" noEditPoints="1" noAdjustHandles="1" noChangeArrowheads="1" noChangeShapeType="1" noTextEdit="1"/>
+          </p:cNvSpPr>
+          <p:nvPr>
+            <p:extLst>
+              <p:ext uri="{386F3935-93C4-4BCD-93E2-E3B085C9AB24}">
+                <p16:designElem xmlns:p16="http://schemas.microsoft.com/office/powerpoint/2015/main" val="1"/>
+              </p:ext>
+            </p:extLst>
+          </p:nvPr>
+        </p:nvSpPr>
+        <p:spPr>
+          <a:xfrm>
+            <a:off x="0" y="-2"/>
+            <a:ext cx="12192000" cy="6858000"/>
+          </a:xfrm>
+          <a:prstGeom prst="rect">
+            <a:avLst/>
+          </a:prstGeom>
           <a:gradFill flip="none" rotWithShape="1">
             <a:gsLst>
               <a:gs pos="100000">
@@ -11210,7 +8916,7 @@
                 <a:schemeClr val="accent2"/>
               </a:gs>
             </a:gsLst>
-            <a:lin ang="2700000" scaled="1"/>
+            <a:lin ang="18900000" scaled="1"/>
             <a:tileRect/>
           </a:gradFill>
           <a:ln>
@@ -11237,21 +8943,89 @@
           <a:bodyPr rtlCol="0" anchor="ctr"/>
           <a:lstStyle/>
           <a:p>
-            <a:pPr algn="ctr"/>
-            <a:endParaRPr lang="en-US">
+            <a:pPr marL="0" marR="0" lvl="0" indent="0" algn="ctr" defTabSz="914400" rtl="0" eaLnBrk="1" fontAlgn="auto" latinLnBrk="0" hangingPunct="1">
+              <a:lnSpc>
+                <a:spcPct val="100000"/>
+              </a:lnSpc>
+              <a:spcBef>
+                <a:spcPts val="0"/>
+              </a:spcBef>
+              <a:spcAft>
+                <a:spcPts val="0"/>
+              </a:spcAft>
+              <a:buClrTx/>
+              <a:buSzTx/>
+              <a:buFontTx/>
+              <a:buNone/>
+              <a:tabLst/>
+              <a:defRPr/>
+            </a:pPr>
+            <a:endParaRPr kumimoji="0" lang="en-US" sz="1800" b="0" i="0" u="none" strike="noStrike" kern="1200" cap="none" spc="0" normalizeH="0" baseline="0" noProof="0">
+              <a:ln>
+                <a:noFill/>
+              </a:ln>
               <a:solidFill>
-                <a:schemeClr val="bg1"/>
+                <a:prstClr val="white"/>
               </a:solidFill>
+              <a:effectLst/>
+              <a:uLnTx/>
+              <a:uFillTx/>
+              <a:latin typeface="Univers"/>
+              <a:ea typeface="+mn-ea"/>
+              <a:cs typeface="+mn-cs"/>
             </a:endParaRPr>
           </a:p>
         </p:txBody>
       </p:sp>
+      <p:pic>
+        <p:nvPicPr>
+          <p:cNvPr id="5" name="Content Placeholder 4" descr="A picture containing text&#10;&#10;Description automatically generated">
+            <a:extLst>
+              <a:ext uri="{FF2B5EF4-FFF2-40B4-BE49-F238E27FC236}">
+                <a16:creationId xmlns:a16="http://schemas.microsoft.com/office/drawing/2014/main" id="{2184F73A-A789-4C1D-94C6-A579C513AD83}"/>
+              </a:ext>
+            </a:extLst>
+          </p:cNvPr>
+          <p:cNvPicPr>
+            <a:picLocks noChangeAspect="1"/>
+          </p:cNvPicPr>
+          <p:nvPr/>
+        </p:nvPicPr>
+        <p:blipFill rotWithShape="1">
+          <a:blip r:embed="rId2">
+            <a:duotone>
+              <a:schemeClr val="accent1">
+                <a:shade val="45000"/>
+                <a:satMod val="135000"/>
+              </a:schemeClr>
+              <a:prstClr val="white"/>
+            </a:duotone>
+            <a:alphaModFix amt="35000"/>
+            <a:extLst>
+              <a:ext uri="{28A0092B-C50C-407E-A947-70E740481C1C}">
+                <a14:useLocalDpi xmlns:a14="http://schemas.microsoft.com/office/drawing/2010/main" val="0"/>
+              </a:ext>
+            </a:extLst>
+          </a:blip>
+          <a:srcRect l="2018" r="2427" b="1"/>
+          <a:stretch/>
+        </p:blipFill>
+        <p:spPr>
+          <a:xfrm>
+            <a:off x="20" y="-8877"/>
+            <a:ext cx="12191980" cy="6858000"/>
+          </a:xfrm>
+          <a:prstGeom prst="rect">
+            <a:avLst/>
+          </a:prstGeom>
+        </p:spPr>
+      </p:pic>
       <p:sp>
         <p:nvSpPr>
           <p:cNvPr id="2" name="Title 1">
             <a:extLst>
               <a:ext uri="{FF2B5EF4-FFF2-40B4-BE49-F238E27FC236}">
-                <a16:creationId xmlns:a16="http://schemas.microsoft.com/office/drawing/2014/main" id="{467143D2-0D45-4512-BD56-E0FECBDB29D1}"/>
+                <a16:creationId xmlns:a16="http://schemas.microsoft.com/office/drawing/2014/main" id="{1EE917C8-8569-489C-9EE8-76718E5D9892}"/>
               </a:ext>
             </a:extLst>
           </p:cNvPr>
@@ -11264,22 +9038,27 @@
         </p:nvSpPr>
         <p:spPr>
           <a:xfrm>
-            <a:off x="479394" y="1062487"/>
-            <a:ext cx="3939688" cy="5583126"/>
+            <a:off x="1188068" y="381935"/>
+            <a:ext cx="9412591" cy="2344840"/>
           </a:xfrm>
         </p:spPr>
         <p:txBody>
-          <a:bodyPr>
+          <a:bodyPr vert="horz" lIns="91440" tIns="45720" rIns="91440" bIns="45720" rtlCol="0" anchor="b">
             <a:normAutofit/>
           </a:bodyPr>
           <a:lstStyle/>
           <a:p>
-            <a:pPr algn="r"/>
+            <a:pPr algn="ctr"/>
             <a:r>
-              <a:rPr lang="en-US" sz="7200">
+              <a:rPr lang="en-US" sz="7200" b="1" i="0" kern="1200" cap="all" baseline="0" dirty="0">
                 <a:solidFill>
-                  <a:schemeClr val="bg1"/>
+                  <a:schemeClr val="accent5">
+                    <a:lumMod val="75000"/>
+                  </a:schemeClr>
                 </a:solidFill>
+                <a:latin typeface="+mj-lt"/>
+                <a:ea typeface="+mj-ea"/>
+                <a:cs typeface="+mj-cs"/>
               </a:rPr>
               <a:t>Overview</a:t>
             </a:r>
@@ -11288,10 +9067,10 @@
       </p:sp>
       <p:sp>
         <p:nvSpPr>
-          <p:cNvPr id="11" name="Graphic 12">
+          <p:cNvPr id="54" name="Graphic 11">
             <a:extLst>
               <a:ext uri="{FF2B5EF4-FFF2-40B4-BE49-F238E27FC236}">
-                <a16:creationId xmlns:a16="http://schemas.microsoft.com/office/drawing/2014/main" id="{58BDB0EE-D238-415B-9ED8-62AA6AB2AAD1}"/>
+                <a16:creationId xmlns:a16="http://schemas.microsoft.com/office/drawing/2014/main" id="{6CB927A4-E432-4310-9CD5-E89FF5063179}"/>
               </a:ext>
               <a:ext uri="{C183D7F6-B498-43B3-948B-1728B52AA6E4}">
                 <adec:decorative xmlns:adec="http://schemas.microsoft.com/office/drawing/2017/decorative" val="1"/>
@@ -11311,46 +9090,46 @@
         </p:nvSpPr>
         <p:spPr>
           <a:xfrm>
-            <a:off x="11433111" y="696037"/>
-            <a:ext cx="139039" cy="139039"/>
+            <a:off x="11013369" y="554152"/>
+            <a:ext cx="171515" cy="171515"/>
           </a:xfrm>
           <a:custGeom>
             <a:avLst/>
             <a:gdLst>
-              <a:gd name="connsiteX0" fmla="*/ 129602 w 139039"/>
-              <a:gd name="connsiteY0" fmla="*/ 60082 h 139039"/>
-              <a:gd name="connsiteX1" fmla="*/ 78957 w 139039"/>
-              <a:gd name="connsiteY1" fmla="*/ 60082 h 139039"/>
-              <a:gd name="connsiteX2" fmla="*/ 78957 w 139039"/>
-              <a:gd name="connsiteY2" fmla="*/ 9437 h 139039"/>
-              <a:gd name="connsiteX3" fmla="*/ 69520 w 139039"/>
-              <a:gd name="connsiteY3" fmla="*/ 0 h 139039"/>
-              <a:gd name="connsiteX4" fmla="*/ 60082 w 139039"/>
-              <a:gd name="connsiteY4" fmla="*/ 9437 h 139039"/>
-              <a:gd name="connsiteX5" fmla="*/ 60082 w 139039"/>
-              <a:gd name="connsiteY5" fmla="*/ 60082 h 139039"/>
-              <a:gd name="connsiteX6" fmla="*/ 9437 w 139039"/>
-              <a:gd name="connsiteY6" fmla="*/ 60082 h 139039"/>
-              <a:gd name="connsiteX7" fmla="*/ 0 w 139039"/>
-              <a:gd name="connsiteY7" fmla="*/ 69520 h 139039"/>
-              <a:gd name="connsiteX8" fmla="*/ 9437 w 139039"/>
-              <a:gd name="connsiteY8" fmla="*/ 78957 h 139039"/>
-              <a:gd name="connsiteX9" fmla="*/ 60082 w 139039"/>
-              <a:gd name="connsiteY9" fmla="*/ 78957 h 139039"/>
-              <a:gd name="connsiteX10" fmla="*/ 60082 w 139039"/>
-              <a:gd name="connsiteY10" fmla="*/ 129602 h 139039"/>
-              <a:gd name="connsiteX11" fmla="*/ 69520 w 139039"/>
-              <a:gd name="connsiteY11" fmla="*/ 139039 h 139039"/>
-              <a:gd name="connsiteX12" fmla="*/ 78957 w 139039"/>
-              <a:gd name="connsiteY12" fmla="*/ 129602 h 139039"/>
-              <a:gd name="connsiteX13" fmla="*/ 78957 w 139039"/>
-              <a:gd name="connsiteY13" fmla="*/ 78957 h 139039"/>
-              <a:gd name="connsiteX14" fmla="*/ 129602 w 139039"/>
-              <a:gd name="connsiteY14" fmla="*/ 78957 h 139039"/>
-              <a:gd name="connsiteX15" fmla="*/ 139039 w 139039"/>
-              <a:gd name="connsiteY15" fmla="*/ 69520 h 139039"/>
-              <a:gd name="connsiteX16" fmla="*/ 129602 w 139039"/>
-              <a:gd name="connsiteY16" fmla="*/ 60082 h 139039"/>
+              <a:gd name="connsiteX0" fmla="*/ 159874 w 171515"/>
+              <a:gd name="connsiteY0" fmla="*/ 74116 h 171515"/>
+              <a:gd name="connsiteX1" fmla="*/ 97399 w 171515"/>
+              <a:gd name="connsiteY1" fmla="*/ 74116 h 171515"/>
+              <a:gd name="connsiteX2" fmla="*/ 97399 w 171515"/>
+              <a:gd name="connsiteY2" fmla="*/ 11641 h 171515"/>
+              <a:gd name="connsiteX3" fmla="*/ 85758 w 171515"/>
+              <a:gd name="connsiteY3" fmla="*/ 0 h 171515"/>
+              <a:gd name="connsiteX4" fmla="*/ 74116 w 171515"/>
+              <a:gd name="connsiteY4" fmla="*/ 11641 h 171515"/>
+              <a:gd name="connsiteX5" fmla="*/ 74116 w 171515"/>
+              <a:gd name="connsiteY5" fmla="*/ 74116 h 171515"/>
+              <a:gd name="connsiteX6" fmla="*/ 11641 w 171515"/>
+              <a:gd name="connsiteY6" fmla="*/ 74116 h 171515"/>
+              <a:gd name="connsiteX7" fmla="*/ 0 w 171515"/>
+              <a:gd name="connsiteY7" fmla="*/ 85758 h 171515"/>
+              <a:gd name="connsiteX8" fmla="*/ 11641 w 171515"/>
+              <a:gd name="connsiteY8" fmla="*/ 97399 h 171515"/>
+              <a:gd name="connsiteX9" fmla="*/ 74116 w 171515"/>
+              <a:gd name="connsiteY9" fmla="*/ 97399 h 171515"/>
+              <a:gd name="connsiteX10" fmla="*/ 74116 w 171515"/>
+              <a:gd name="connsiteY10" fmla="*/ 159874 h 171515"/>
+              <a:gd name="connsiteX11" fmla="*/ 85758 w 171515"/>
+              <a:gd name="connsiteY11" fmla="*/ 171515 h 171515"/>
+              <a:gd name="connsiteX12" fmla="*/ 97399 w 171515"/>
+              <a:gd name="connsiteY12" fmla="*/ 159874 h 171515"/>
+              <a:gd name="connsiteX13" fmla="*/ 97399 w 171515"/>
+              <a:gd name="connsiteY13" fmla="*/ 97399 h 171515"/>
+              <a:gd name="connsiteX14" fmla="*/ 159874 w 171515"/>
+              <a:gd name="connsiteY14" fmla="*/ 97399 h 171515"/>
+              <a:gd name="connsiteX15" fmla="*/ 171515 w 171515"/>
+              <a:gd name="connsiteY15" fmla="*/ 85758 h 171515"/>
+              <a:gd name="connsiteX16" fmla="*/ 159874 w 171515"/>
+              <a:gd name="connsiteY16" fmla="*/ 74116 h 171515"/>
             </a:gdLst>
             <a:ahLst/>
             <a:cxnLst>
@@ -11408,82 +9187,82 @@
             </a:cxnLst>
             <a:rect l="l" t="t" r="r" b="b"/>
             <a:pathLst>
-              <a:path w="139039" h="139039">
+              <a:path w="171515" h="171515">
                 <a:moveTo>
-                  <a:pt x="129602" y="60082"/>
+                  <a:pt x="159874" y="74116"/>
                 </a:moveTo>
                 <a:lnTo>
-                  <a:pt x="78957" y="60082"/>
+                  <a:pt x="97399" y="74116"/>
                 </a:lnTo>
                 <a:lnTo>
-                  <a:pt x="78957" y="9437"/>
+                  <a:pt x="97399" y="11641"/>
                 </a:lnTo>
                 <a:cubicBezTo>
-                  <a:pt x="78957" y="4225"/>
-                  <a:pt x="74731" y="0"/>
-                  <a:pt x="69520" y="0"/>
+                  <a:pt x="97399" y="5212"/>
+                  <a:pt x="92187" y="0"/>
+                  <a:pt x="85758" y="0"/>
                 </a:cubicBezTo>
                 <a:cubicBezTo>
-                  <a:pt x="64308" y="0"/>
-                  <a:pt x="60082" y="4225"/>
-                  <a:pt x="60082" y="9437"/>
+                  <a:pt x="79328" y="0"/>
+                  <a:pt x="74116" y="5212"/>
+                  <a:pt x="74116" y="11641"/>
                 </a:cubicBezTo>
                 <a:lnTo>
-                  <a:pt x="60082" y="60082"/>
+                  <a:pt x="74116" y="74116"/>
                 </a:lnTo>
                 <a:lnTo>
-                  <a:pt x="9437" y="60082"/>
+                  <a:pt x="11641" y="74116"/>
                 </a:lnTo>
                 <a:cubicBezTo>
-                  <a:pt x="4225" y="60082"/>
-                  <a:pt x="0" y="64308"/>
-                  <a:pt x="0" y="69520"/>
+                  <a:pt x="5212" y="74116"/>
+                  <a:pt x="0" y="79328"/>
+                  <a:pt x="0" y="85758"/>
                 </a:cubicBezTo>
                 <a:cubicBezTo>
-                  <a:pt x="0" y="74731"/>
-                  <a:pt x="4225" y="78957"/>
-                  <a:pt x="9437" y="78957"/>
+                  <a:pt x="0" y="92187"/>
+                  <a:pt x="5212" y="97399"/>
+                  <a:pt x="11641" y="97399"/>
                 </a:cubicBezTo>
                 <a:lnTo>
-                  <a:pt x="60082" y="78957"/>
+                  <a:pt x="74116" y="97399"/>
                 </a:lnTo>
                 <a:lnTo>
-                  <a:pt x="60082" y="129602"/>
+                  <a:pt x="74116" y="159874"/>
                 </a:lnTo>
                 <a:cubicBezTo>
-                  <a:pt x="60082" y="134814"/>
-                  <a:pt x="64308" y="139039"/>
-                  <a:pt x="69520" y="139039"/>
+                  <a:pt x="74116" y="166303"/>
+                  <a:pt x="79328" y="171515"/>
+                  <a:pt x="85758" y="171515"/>
                 </a:cubicBezTo>
                 <a:cubicBezTo>
-                  <a:pt x="74731" y="139039"/>
-                  <a:pt x="78957" y="134814"/>
-                  <a:pt x="78957" y="129602"/>
+                  <a:pt x="92187" y="171515"/>
+                  <a:pt x="97399" y="166303"/>
+                  <a:pt x="97399" y="159874"/>
                 </a:cubicBezTo>
                 <a:lnTo>
-                  <a:pt x="78957" y="78957"/>
+                  <a:pt x="97399" y="97399"/>
                 </a:lnTo>
                 <a:lnTo>
-                  <a:pt x="129602" y="78957"/>
+                  <a:pt x="159874" y="97399"/>
                 </a:lnTo>
                 <a:cubicBezTo>
-                  <a:pt x="134814" y="78957"/>
-                  <a:pt x="139039" y="74731"/>
-                  <a:pt x="139039" y="69520"/>
+                  <a:pt x="166303" y="97399"/>
+                  <a:pt x="171515" y="92187"/>
+                  <a:pt x="171515" y="85758"/>
                 </a:cubicBezTo>
                 <a:cubicBezTo>
-                  <a:pt x="139039" y="64308"/>
-                  <a:pt x="134814" y="60082"/>
-                  <a:pt x="129602" y="60082"/>
+                  <a:pt x="171515" y="79328"/>
+                  <a:pt x="166303" y="74116"/>
+                  <a:pt x="159874" y="74116"/>
                 </a:cubicBezTo>
                 <a:close/>
               </a:path>
             </a:pathLst>
           </a:custGeom>
           <a:solidFill>
-            <a:schemeClr val="bg1"/>
+            <a:srgbClr val="FFFFFF"/>
           </a:solidFill>
-          <a:ln w="603" cap="flat">
+          <a:ln w="776" cap="flat">
             <a:noFill/>
             <a:prstDash val="solid"/>
             <a:miter/>
@@ -11493,16 +9272,46 @@
           <a:bodyPr rtlCol="0" anchor="ctr"/>
           <a:lstStyle/>
           <a:p>
-            <a:endParaRPr lang="en-US"/>
+            <a:pPr marL="0" marR="0" lvl="0" indent="0" algn="l" defTabSz="914400" rtl="0" eaLnBrk="1" fontAlgn="auto" latinLnBrk="0" hangingPunct="1">
+              <a:lnSpc>
+                <a:spcPct val="100000"/>
+              </a:lnSpc>
+              <a:spcBef>
+                <a:spcPts val="0"/>
+              </a:spcBef>
+              <a:spcAft>
+                <a:spcPts val="0"/>
+              </a:spcAft>
+              <a:buClrTx/>
+              <a:buSzTx/>
+              <a:buFontTx/>
+              <a:buNone/>
+              <a:tabLst/>
+              <a:defRPr/>
+            </a:pPr>
+            <a:endParaRPr kumimoji="0" lang="en-US" sz="1800" b="0" i="0" u="none" strike="noStrike" kern="1200" cap="none" spc="0" normalizeH="0" baseline="0" noProof="0">
+              <a:ln>
+                <a:noFill/>
+              </a:ln>
+              <a:solidFill>
+                <a:prstClr val="black"/>
+              </a:solidFill>
+              <a:effectLst/>
+              <a:uLnTx/>
+              <a:uFillTx/>
+              <a:latin typeface="Univers"/>
+              <a:ea typeface="+mn-ea"/>
+              <a:cs typeface="+mn-cs"/>
+            </a:endParaRPr>
           </a:p>
         </p:txBody>
       </p:sp>
       <p:sp>
         <p:nvSpPr>
-          <p:cNvPr id="13" name="Graphic 11">
+          <p:cNvPr id="55" name="Graphic 10">
             <a:extLst>
               <a:ext uri="{FF2B5EF4-FFF2-40B4-BE49-F238E27FC236}">
-                <a16:creationId xmlns:a16="http://schemas.microsoft.com/office/drawing/2014/main" id="{C5B55FC3-961D-4325-82F1-DE92B0D04E03}"/>
+                <a16:creationId xmlns:a16="http://schemas.microsoft.com/office/drawing/2014/main" id="{E3020543-B24B-4EC4-8FFC-8DD88EEA91A8}"/>
               </a:ext>
               <a:ext uri="{C183D7F6-B498-43B3-948B-1728B52AA6E4}">
                 <adec:decorative xmlns:adec="http://schemas.microsoft.com/office/drawing/2017/decorative" val="1"/>
@@ -11522,22 +9331,22 @@
         </p:nvSpPr>
         <p:spPr>
           <a:xfrm>
-            <a:off x="11791891" y="925332"/>
-            <a:ext cx="91138" cy="91138"/>
+            <a:off x="11455951" y="837005"/>
+            <a:ext cx="112426" cy="112426"/>
           </a:xfrm>
           <a:custGeom>
             <a:avLst/>
             <a:gdLst>
-              <a:gd name="connsiteX0" fmla="*/ 91138 w 91138"/>
-              <a:gd name="connsiteY0" fmla="*/ 45569 h 91138"/>
-              <a:gd name="connsiteX1" fmla="*/ 45569 w 91138"/>
-              <a:gd name="connsiteY1" fmla="*/ 91138 h 91138"/>
-              <a:gd name="connsiteX2" fmla="*/ 0 w 91138"/>
-              <a:gd name="connsiteY2" fmla="*/ 45569 h 91138"/>
-              <a:gd name="connsiteX3" fmla="*/ 45569 w 91138"/>
-              <a:gd name="connsiteY3" fmla="*/ 0 h 91138"/>
-              <a:gd name="connsiteX4" fmla="*/ 91138 w 91138"/>
-              <a:gd name="connsiteY4" fmla="*/ 45569 h 91138"/>
+              <a:gd name="connsiteX0" fmla="*/ 112426 w 112426"/>
+              <a:gd name="connsiteY0" fmla="*/ 56213 h 112426"/>
+              <a:gd name="connsiteX1" fmla="*/ 56213 w 112426"/>
+              <a:gd name="connsiteY1" fmla="*/ 112426 h 112426"/>
+              <a:gd name="connsiteX2" fmla="*/ 0 w 112426"/>
+              <a:gd name="connsiteY2" fmla="*/ 56213 h 112426"/>
+              <a:gd name="connsiteX3" fmla="*/ 56213 w 112426"/>
+              <a:gd name="connsiteY3" fmla="*/ 0 h 112426"/>
+              <a:gd name="connsiteX4" fmla="*/ 112426 w 112426"/>
+              <a:gd name="connsiteY4" fmla="*/ 56213 h 112426"/>
             </a:gdLst>
             <a:ahLst/>
             <a:cxnLst>
@@ -11559,38 +9368,38 @@
             </a:cxnLst>
             <a:rect l="l" t="t" r="r" b="b"/>
             <a:pathLst>
-              <a:path w="91138" h="91138">
+              <a:path w="112426" h="112426">
                 <a:moveTo>
-                  <a:pt x="91138" y="45569"/>
+                  <a:pt x="112426" y="56213"/>
                 </a:moveTo>
                 <a:cubicBezTo>
-                  <a:pt x="91138" y="70736"/>
-                  <a:pt x="70736" y="91138"/>
-                  <a:pt x="45569" y="91138"/>
+                  <a:pt x="112426" y="87259"/>
+                  <a:pt x="87259" y="112426"/>
+                  <a:pt x="56213" y="112426"/>
                 </a:cubicBezTo>
                 <a:cubicBezTo>
-                  <a:pt x="20402" y="91138"/>
-                  <a:pt x="0" y="70736"/>
-                  <a:pt x="0" y="45569"/>
+                  <a:pt x="25167" y="112426"/>
+                  <a:pt x="0" y="87259"/>
+                  <a:pt x="0" y="56213"/>
                 </a:cubicBezTo>
                 <a:cubicBezTo>
-                  <a:pt x="0" y="20402"/>
-                  <a:pt x="20402" y="0"/>
-                  <a:pt x="45569" y="0"/>
+                  <a:pt x="0" y="25167"/>
+                  <a:pt x="25167" y="0"/>
+                  <a:pt x="56213" y="0"/>
                 </a:cubicBezTo>
                 <a:cubicBezTo>
-                  <a:pt x="70736" y="0"/>
-                  <a:pt x="91138" y="20402"/>
-                  <a:pt x="91138" y="45569"/>
+                  <a:pt x="87259" y="0"/>
+                  <a:pt x="112426" y="25167"/>
+                  <a:pt x="112426" y="56213"/>
                 </a:cubicBezTo>
                 <a:close/>
               </a:path>
             </a:pathLst>
           </a:custGeom>
           <a:solidFill>
-            <a:schemeClr val="bg1"/>
+            <a:srgbClr val="FFFFFF"/>
           </a:solidFill>
-          <a:ln w="422" cap="flat">
+          <a:ln w="516" cap="flat">
             <a:noFill/>
             <a:prstDash val="solid"/>
             <a:miter/>
@@ -11600,16 +9409,231 @@
           <a:bodyPr rtlCol="0" anchor="ctr"/>
           <a:lstStyle/>
           <a:p>
-            <a:endParaRPr lang="en-US"/>
+            <a:pPr marL="0" marR="0" lvl="0" indent="0" algn="l" defTabSz="914400" rtl="0" eaLnBrk="1" fontAlgn="auto" latinLnBrk="0" hangingPunct="1">
+              <a:lnSpc>
+                <a:spcPct val="100000"/>
+              </a:lnSpc>
+              <a:spcBef>
+                <a:spcPts val="0"/>
+              </a:spcBef>
+              <a:spcAft>
+                <a:spcPts val="0"/>
+              </a:spcAft>
+              <a:buClrTx/>
+              <a:buSzTx/>
+              <a:buFontTx/>
+              <a:buNone/>
+              <a:tabLst/>
+              <a:defRPr/>
+            </a:pPr>
+            <a:endParaRPr kumimoji="0" lang="en-US" sz="1800" b="0" i="0" u="none" strike="noStrike" kern="1200" cap="none" spc="0" normalizeH="0" baseline="0" noProof="0">
+              <a:ln>
+                <a:noFill/>
+              </a:ln>
+              <a:solidFill>
+                <a:prstClr val="black"/>
+              </a:solidFill>
+              <a:effectLst/>
+              <a:uLnTx/>
+              <a:uFillTx/>
+              <a:latin typeface="Univers"/>
+              <a:ea typeface="+mn-ea"/>
+              <a:cs typeface="+mn-cs"/>
+            </a:endParaRPr>
+          </a:p>
+        </p:txBody>
+      </p:sp>
+      <p:sp>
+        <p:nvSpPr>
+          <p:cNvPr id="56" name="Graphic 12">
+            <a:extLst>
+              <a:ext uri="{FF2B5EF4-FFF2-40B4-BE49-F238E27FC236}">
+                <a16:creationId xmlns:a16="http://schemas.microsoft.com/office/drawing/2014/main" id="{1453BF6C-B012-48B7-B4E8-6D7AC7C27D02}"/>
+              </a:ext>
+              <a:ext uri="{C183D7F6-B498-43B3-948B-1728B52AA6E4}">
+                <adec:decorative xmlns:adec="http://schemas.microsoft.com/office/drawing/2017/decorative" val="1"/>
+              </a:ext>
+            </a:extLst>
+          </p:cNvPr>
+          <p:cNvSpPr>
+            <a:spLocks noGrp="1" noRot="1" noChangeAspect="1" noMove="1" noResize="1" noEditPoints="1" noAdjustHandles="1" noChangeArrowheads="1" noChangeShapeType="1" noTextEdit="1"/>
+          </p:cNvSpPr>
+          <p:nvPr>
+            <p:extLst>
+              <p:ext uri="{386F3935-93C4-4BCD-93E2-E3B085C9AB24}">
+                <p16:designElem xmlns:p16="http://schemas.microsoft.com/office/powerpoint/2015/main" val="1"/>
+              </p:ext>
+            </p:extLst>
+          </p:nvPr>
+        </p:nvSpPr>
+        <p:spPr>
+          <a:xfrm>
+            <a:off x="10994200" y="1472473"/>
+            <a:ext cx="157545" cy="157545"/>
+          </a:xfrm>
+          <a:custGeom>
+            <a:avLst/>
+            <a:gdLst>
+              <a:gd name="connsiteX0" fmla="*/ 78773 w 157545"/>
+              <a:gd name="connsiteY0" fmla="*/ 23283 h 157545"/>
+              <a:gd name="connsiteX1" fmla="*/ 134262 w 157545"/>
+              <a:gd name="connsiteY1" fmla="*/ 78773 h 157545"/>
+              <a:gd name="connsiteX2" fmla="*/ 78773 w 157545"/>
+              <a:gd name="connsiteY2" fmla="*/ 134262 h 157545"/>
+              <a:gd name="connsiteX3" fmla="*/ 23283 w 157545"/>
+              <a:gd name="connsiteY3" fmla="*/ 78773 h 157545"/>
+              <a:gd name="connsiteX4" fmla="*/ 78773 w 157545"/>
+              <a:gd name="connsiteY4" fmla="*/ 23283 h 157545"/>
+              <a:gd name="connsiteX5" fmla="*/ 78773 w 157545"/>
+              <a:gd name="connsiteY5" fmla="*/ 0 h 157545"/>
+              <a:gd name="connsiteX6" fmla="*/ 0 w 157545"/>
+              <a:gd name="connsiteY6" fmla="*/ 78773 h 157545"/>
+              <a:gd name="connsiteX7" fmla="*/ 78773 w 157545"/>
+              <a:gd name="connsiteY7" fmla="*/ 157545 h 157545"/>
+              <a:gd name="connsiteX8" fmla="*/ 157545 w 157545"/>
+              <a:gd name="connsiteY8" fmla="*/ 78773 h 157545"/>
+              <a:gd name="connsiteX9" fmla="*/ 78773 w 157545"/>
+              <a:gd name="connsiteY9" fmla="*/ 0 h 157545"/>
+            </a:gdLst>
+            <a:ahLst/>
+            <a:cxnLst>
+              <a:cxn ang="0">
+                <a:pos x="connsiteX0" y="connsiteY0"/>
+              </a:cxn>
+              <a:cxn ang="0">
+                <a:pos x="connsiteX1" y="connsiteY1"/>
+              </a:cxn>
+              <a:cxn ang="0">
+                <a:pos x="connsiteX2" y="connsiteY2"/>
+              </a:cxn>
+              <a:cxn ang="0">
+                <a:pos x="connsiteX3" y="connsiteY3"/>
+              </a:cxn>
+              <a:cxn ang="0">
+                <a:pos x="connsiteX4" y="connsiteY4"/>
+              </a:cxn>
+              <a:cxn ang="0">
+                <a:pos x="connsiteX5" y="connsiteY5"/>
+              </a:cxn>
+              <a:cxn ang="0">
+                <a:pos x="connsiteX6" y="connsiteY6"/>
+              </a:cxn>
+              <a:cxn ang="0">
+                <a:pos x="connsiteX7" y="connsiteY7"/>
+              </a:cxn>
+              <a:cxn ang="0">
+                <a:pos x="connsiteX8" y="connsiteY8"/>
+              </a:cxn>
+              <a:cxn ang="0">
+                <a:pos x="connsiteX9" y="connsiteY9"/>
+              </a:cxn>
+            </a:cxnLst>
+            <a:rect l="l" t="t" r="r" b="b"/>
+            <a:pathLst>
+              <a:path w="157545" h="157545">
+                <a:moveTo>
+                  <a:pt x="78773" y="23283"/>
+                </a:moveTo>
+                <a:cubicBezTo>
+                  <a:pt x="109419" y="23283"/>
+                  <a:pt x="134262" y="48126"/>
+                  <a:pt x="134262" y="78773"/>
+                </a:cubicBezTo>
+                <a:cubicBezTo>
+                  <a:pt x="134262" y="109419"/>
+                  <a:pt x="109419" y="134262"/>
+                  <a:pt x="78773" y="134262"/>
+                </a:cubicBezTo>
+                <a:cubicBezTo>
+                  <a:pt x="48126" y="134262"/>
+                  <a:pt x="23283" y="109419"/>
+                  <a:pt x="23283" y="78773"/>
+                </a:cubicBezTo>
+                <a:cubicBezTo>
+                  <a:pt x="23312" y="48139"/>
+                  <a:pt x="48139" y="23312"/>
+                  <a:pt x="78773" y="23283"/>
+                </a:cubicBezTo>
+                <a:moveTo>
+                  <a:pt x="78773" y="0"/>
+                </a:moveTo>
+                <a:cubicBezTo>
+                  <a:pt x="35268" y="0"/>
+                  <a:pt x="0" y="35268"/>
+                  <a:pt x="0" y="78773"/>
+                </a:cubicBezTo>
+                <a:cubicBezTo>
+                  <a:pt x="0" y="122277"/>
+                  <a:pt x="35268" y="157545"/>
+                  <a:pt x="78773" y="157545"/>
+                </a:cubicBezTo>
+                <a:cubicBezTo>
+                  <a:pt x="122277" y="157545"/>
+                  <a:pt x="157545" y="122277"/>
+                  <a:pt x="157545" y="78773"/>
+                </a:cubicBezTo>
+                <a:cubicBezTo>
+                  <a:pt x="157545" y="35268"/>
+                  <a:pt x="122277" y="0"/>
+                  <a:pt x="78773" y="0"/>
+                </a:cubicBezTo>
+                <a:close/>
+              </a:path>
+            </a:pathLst>
+          </a:custGeom>
+          <a:solidFill>
+            <a:srgbClr val="FFFFFF"/>
+          </a:solidFill>
+          <a:ln w="751" cap="flat">
+            <a:noFill/>
+            <a:prstDash val="solid"/>
+            <a:miter/>
+          </a:ln>
+        </p:spPr>
+        <p:txBody>
+          <a:bodyPr rtlCol="0" anchor="ctr"/>
+          <a:lstStyle/>
+          <a:p>
+            <a:pPr marL="0" marR="0" lvl="0" indent="0" algn="l" defTabSz="914400" rtl="0" eaLnBrk="1" fontAlgn="auto" latinLnBrk="0" hangingPunct="1">
+              <a:lnSpc>
+                <a:spcPct val="100000"/>
+              </a:lnSpc>
+              <a:spcBef>
+                <a:spcPts val="0"/>
+              </a:spcBef>
+              <a:spcAft>
+                <a:spcPts val="0"/>
+              </a:spcAft>
+              <a:buClrTx/>
+              <a:buSzTx/>
+              <a:buFontTx/>
+              <a:buNone/>
+              <a:tabLst/>
+              <a:defRPr/>
+            </a:pPr>
+            <a:endParaRPr kumimoji="0" lang="en-US" sz="1800" b="0" i="0" u="none" strike="noStrike" kern="1200" cap="none" spc="0" normalizeH="0" baseline="0" noProof="0">
+              <a:ln>
+                <a:noFill/>
+              </a:ln>
+              <a:solidFill>
+                <a:prstClr val="black"/>
+              </a:solidFill>
+              <a:effectLst/>
+              <a:uLnTx/>
+              <a:uFillTx/>
+              <a:latin typeface="Univers"/>
+              <a:ea typeface="+mn-ea"/>
+              <a:cs typeface="+mn-cs"/>
+            </a:endParaRPr>
           </a:p>
         </p:txBody>
       </p:sp>
       <p:cxnSp>
         <p:nvCxnSpPr>
-          <p:cNvPr id="15" name="Straight Connector 14">
+          <p:cNvPr id="57" name="Straight Connector">
             <a:extLst>
               <a:ext uri="{FF2B5EF4-FFF2-40B4-BE49-F238E27FC236}">
-                <a16:creationId xmlns:a16="http://schemas.microsoft.com/office/drawing/2014/main" id="{C8F51B3F-8331-4E4A-AE96-D47B1006EEAD}"/>
+                <a16:creationId xmlns:a16="http://schemas.microsoft.com/office/drawing/2014/main" id="{C49DA8F6-BCC1-4447-B54C-57856834B94B}"/>
               </a:ext>
               <a:ext uri="{C183D7F6-B498-43B3-948B-1728B52AA6E4}">
                 <adec:decorative xmlns:adec="http://schemas.microsoft.com/office/drawing/2017/decorative" val="1"/>
@@ -11629,19 +9653,15 @@
         </p:nvCxnSpPr>
         <p:spPr>
           <a:xfrm>
-            <a:off x="4728053" y="1132114"/>
-            <a:ext cx="0" cy="5717573"/>
+            <a:off x="623622" y="3610394"/>
+            <a:ext cx="0" cy="3238728"/>
           </a:xfrm>
           <a:prstGeom prst="line">
             <a:avLst/>
           </a:prstGeom>
           <a:ln w="25400" cap="sq">
             <a:solidFill>
-              <a:schemeClr val="lt1">
-                <a:hueOff val="0"/>
-                <a:satOff val="0"/>
-                <a:lumOff val="0"/>
-              </a:schemeClr>
+              <a:schemeClr val="bg1"/>
             </a:solidFill>
             <a:bevel/>
           </a:ln>
@@ -11663,194 +9683,62 @@
       </p:cxnSp>
       <p:sp>
         <p:nvSpPr>
-          <p:cNvPr id="17" name="Graphic 13">
+          <p:cNvPr id="22" name="Content Placeholder 21">
             <a:extLst>
               <a:ext uri="{FF2B5EF4-FFF2-40B4-BE49-F238E27FC236}">
-                <a16:creationId xmlns:a16="http://schemas.microsoft.com/office/drawing/2014/main" id="{4C8AB332-D09E-4F28-943C-DABDD4716A3C}"/>
-              </a:ext>
-              <a:ext uri="{C183D7F6-B498-43B3-948B-1728B52AA6E4}">
-                <adec:decorative xmlns:adec="http://schemas.microsoft.com/office/drawing/2017/decorative" val="1"/>
+                <a16:creationId xmlns:a16="http://schemas.microsoft.com/office/drawing/2014/main" id="{9C3C818E-619E-DFED-D287-3740315895D6}"/>
               </a:ext>
             </a:extLst>
           </p:cNvPr>
           <p:cNvSpPr>
-            <a:spLocks noGrp="1" noRot="1" noChangeAspect="1" noMove="1" noResize="1" noEditPoints="1" noAdjustHandles="1" noChangeArrowheads="1" noChangeShapeType="1" noTextEdit="1"/>
+            <a:spLocks noGrp="1"/>
           </p:cNvSpPr>
           <p:nvPr>
-            <p:extLst>
-              <p:ext uri="{386F3935-93C4-4BCD-93E2-E3B085C9AB24}">
-                <p16:designElem xmlns:p16="http://schemas.microsoft.com/office/powerpoint/2015/main" val="1"/>
-              </p:ext>
-            </p:extLst>
+            <p:ph idx="1"/>
           </p:nvPr>
         </p:nvSpPr>
         <p:spPr>
           <a:xfrm>
-            <a:off x="11417571" y="1440476"/>
-            <a:ext cx="127714" cy="127714"/>
+            <a:off x="1188069" y="3175552"/>
+            <a:ext cx="9678404" cy="2555397"/>
           </a:xfrm>
-          <a:custGeom>
-            <a:avLst/>
-            <a:gdLst>
-              <a:gd name="connsiteX0" fmla="*/ 63857 w 127714"/>
-              <a:gd name="connsiteY0" fmla="*/ 18874 h 127714"/>
-              <a:gd name="connsiteX1" fmla="*/ 108840 w 127714"/>
-              <a:gd name="connsiteY1" fmla="*/ 63857 h 127714"/>
-              <a:gd name="connsiteX2" fmla="*/ 63857 w 127714"/>
-              <a:gd name="connsiteY2" fmla="*/ 108840 h 127714"/>
-              <a:gd name="connsiteX3" fmla="*/ 18874 w 127714"/>
-              <a:gd name="connsiteY3" fmla="*/ 63857 h 127714"/>
-              <a:gd name="connsiteX4" fmla="*/ 63857 w 127714"/>
-              <a:gd name="connsiteY4" fmla="*/ 18874 h 127714"/>
-              <a:gd name="connsiteX5" fmla="*/ 63857 w 127714"/>
-              <a:gd name="connsiteY5" fmla="*/ 0 h 127714"/>
-              <a:gd name="connsiteX6" fmla="*/ 0 w 127714"/>
-              <a:gd name="connsiteY6" fmla="*/ 63857 h 127714"/>
-              <a:gd name="connsiteX7" fmla="*/ 63857 w 127714"/>
-              <a:gd name="connsiteY7" fmla="*/ 127714 h 127714"/>
-              <a:gd name="connsiteX8" fmla="*/ 127714 w 127714"/>
-              <a:gd name="connsiteY8" fmla="*/ 63857 h 127714"/>
-              <a:gd name="connsiteX9" fmla="*/ 63857 w 127714"/>
-              <a:gd name="connsiteY9" fmla="*/ 0 h 127714"/>
-            </a:gdLst>
-            <a:ahLst/>
-            <a:cxnLst>
-              <a:cxn ang="0">
-                <a:pos x="connsiteX0" y="connsiteY0"/>
-              </a:cxn>
-              <a:cxn ang="0">
-                <a:pos x="connsiteX1" y="connsiteY1"/>
-              </a:cxn>
-              <a:cxn ang="0">
-                <a:pos x="connsiteX2" y="connsiteY2"/>
-              </a:cxn>
-              <a:cxn ang="0">
-                <a:pos x="connsiteX3" y="connsiteY3"/>
-              </a:cxn>
-              <a:cxn ang="0">
-                <a:pos x="connsiteX4" y="connsiteY4"/>
-              </a:cxn>
-              <a:cxn ang="0">
-                <a:pos x="connsiteX5" y="connsiteY5"/>
-              </a:cxn>
-              <a:cxn ang="0">
-                <a:pos x="connsiteX6" y="connsiteY6"/>
-              </a:cxn>
-              <a:cxn ang="0">
-                <a:pos x="connsiteX7" y="connsiteY7"/>
-              </a:cxn>
-              <a:cxn ang="0">
-                <a:pos x="connsiteX8" y="connsiteY8"/>
-              </a:cxn>
-              <a:cxn ang="0">
-                <a:pos x="connsiteX9" y="connsiteY9"/>
-              </a:cxn>
-            </a:cxnLst>
-            <a:rect l="l" t="t" r="r" b="b"/>
-            <a:pathLst>
-              <a:path w="127714" h="127714">
-                <a:moveTo>
-                  <a:pt x="63857" y="18874"/>
-                </a:moveTo>
-                <a:cubicBezTo>
-                  <a:pt x="88700" y="18874"/>
-                  <a:pt x="108840" y="39014"/>
-                  <a:pt x="108840" y="63857"/>
-                </a:cubicBezTo>
-                <a:cubicBezTo>
-                  <a:pt x="108840" y="88700"/>
-                  <a:pt x="88700" y="108840"/>
-                  <a:pt x="63857" y="108840"/>
-                </a:cubicBezTo>
-                <a:cubicBezTo>
-                  <a:pt x="39014" y="108840"/>
-                  <a:pt x="18874" y="88700"/>
-                  <a:pt x="18874" y="63857"/>
-                </a:cubicBezTo>
-                <a:cubicBezTo>
-                  <a:pt x="18898" y="39024"/>
-                  <a:pt x="39024" y="18898"/>
-                  <a:pt x="63857" y="18874"/>
-                </a:cubicBezTo>
-                <a:moveTo>
-                  <a:pt x="63857" y="0"/>
-                </a:moveTo>
-                <a:cubicBezTo>
-                  <a:pt x="28590" y="0"/>
-                  <a:pt x="0" y="28590"/>
-                  <a:pt x="0" y="63857"/>
-                </a:cubicBezTo>
-                <a:cubicBezTo>
-                  <a:pt x="0" y="99124"/>
-                  <a:pt x="28590" y="127714"/>
-                  <a:pt x="63857" y="127714"/>
-                </a:cubicBezTo>
-                <a:cubicBezTo>
-                  <a:pt x="99124" y="127714"/>
-                  <a:pt x="127714" y="99124"/>
-                  <a:pt x="127714" y="63857"/>
-                </a:cubicBezTo>
-                <a:cubicBezTo>
-                  <a:pt x="127714" y="28590"/>
-                  <a:pt x="99124" y="0"/>
-                  <a:pt x="63857" y="0"/>
-                </a:cubicBezTo>
-                <a:close/>
-              </a:path>
-            </a:pathLst>
-          </a:custGeom>
-          <a:solidFill>
-            <a:schemeClr val="bg1"/>
-          </a:solidFill>
-          <a:ln w="610" cap="flat">
-            <a:noFill/>
-            <a:prstDash val="solid"/>
-            <a:miter/>
-          </a:ln>
         </p:spPr>
         <p:txBody>
-          <a:bodyPr rtlCol="0" anchor="ctr"/>
+          <a:bodyPr anchor="t">
+            <a:normAutofit lnSpcReduction="10000"/>
+          </a:bodyPr>
           <a:lstStyle/>
           <a:p>
-            <a:endParaRPr lang="en-US"/>
+            <a:pPr marL="0" indent="0" algn="ctr">
+              <a:buNone/>
+            </a:pPr>
+            <a:r>
+              <a:rPr lang="en-US" sz="3600" b="0" i="0" dirty="0">
+                <a:solidFill>
+                  <a:srgbClr val="C00000"/>
+                </a:solidFill>
+              </a:rPr>
+              <a:t>Social media makes it easy to connect with people from around the entire world. While this is positive, it also has detrimental effects. As social media and smartphone use has increased, so have mental health conditions. </a:t>
+            </a:r>
+            <a:endParaRPr lang="en-US" sz="3600" dirty="0">
+              <a:solidFill>
+                <a:srgbClr val="C00000"/>
+              </a:solidFill>
+            </a:endParaRPr>
+          </a:p>
+          <a:p>
+            <a:endParaRPr lang="en-US" sz="1800" dirty="0">
+              <a:solidFill>
+                <a:srgbClr val="FFFFFF"/>
+              </a:solidFill>
+            </a:endParaRPr>
           </a:p>
         </p:txBody>
       </p:sp>
-      <p:graphicFrame>
-        <p:nvGraphicFramePr>
-          <p:cNvPr id="5" name="Content Placeholder 2">
-            <a:extLst>
-              <a:ext uri="{FF2B5EF4-FFF2-40B4-BE49-F238E27FC236}">
-                <a16:creationId xmlns:a16="http://schemas.microsoft.com/office/drawing/2014/main" id="{2FC937E9-DB35-06F1-E74E-A8E152F33E31}"/>
-              </a:ext>
-            </a:extLst>
-          </p:cNvPr>
-          <p:cNvGraphicFramePr>
-            <a:graphicFrameLocks noGrp="1"/>
-          </p:cNvGraphicFramePr>
-          <p:nvPr>
-            <p:ph idx="1"/>
-            <p:extLst>
-              <p:ext uri="{D42A27DB-BD31-4B8C-83A1-F6EECF244321}">
-                <p14:modId xmlns:p14="http://schemas.microsoft.com/office/powerpoint/2010/main" val="3608475254"/>
-              </p:ext>
-            </p:extLst>
-          </p:nvPr>
-        </p:nvGraphicFramePr>
-        <p:xfrm>
-          <a:off x="5108535" y="1070800"/>
-          <a:ext cx="6245265" cy="5589347"/>
-        </p:xfrm>
-        <a:graphic>
-          <a:graphicData uri="http://schemas.openxmlformats.org/drawingml/2006/diagram">
-            <dgm:relIds xmlns:dgm="http://schemas.openxmlformats.org/drawingml/2006/diagram" xmlns:r="http://schemas.openxmlformats.org/officeDocument/2006/relationships" r:dm="rId2" r:lo="rId3" r:qs="rId4" r:cs="rId5"/>
-          </a:graphicData>
-        </a:graphic>
-      </p:graphicFrame>
     </p:spTree>
     <p:extLst>
       <p:ext uri="{BB962C8B-B14F-4D97-AF65-F5344CB8AC3E}">
-        <p14:creationId xmlns:p14="http://schemas.microsoft.com/office/powerpoint/2010/main" val="3432265902"/>
+        <p14:creationId xmlns:p14="http://schemas.microsoft.com/office/powerpoint/2010/main" val="3003823638"/>
       </p:ext>
     </p:extLst>
   </p:cSld>
@@ -12460,7 +10348,7 @@
               <a:buNone/>
             </a:pPr>
             <a:r>
-              <a:rPr lang="en-US" sz="1800" b="0" i="0">
+              <a:rPr lang="en-US" sz="1800" b="0" i="0" dirty="0">
                 <a:effectLst/>
                 <a:latin typeface="-apple-system"/>
               </a:rPr>
@@ -12471,7 +10359,7 @@
             <a:pPr marL="0" indent="0">
               <a:buNone/>
             </a:pPr>
-            <a:endParaRPr lang="en-US" sz="1800" b="0" i="0">
+            <a:endParaRPr lang="en-US" sz="1800" b="0" i="0" dirty="0">
               <a:effectLst/>
               <a:latin typeface="-apple-system"/>
             </a:endParaRPr>
@@ -12482,7 +10370,7 @@
               <a:buChar char="•"/>
             </a:pPr>
             <a:r>
-              <a:rPr lang="en-US" sz="1800" b="0" i="0">
+              <a:rPr lang="en-US" sz="1800" b="0" i="0" dirty="0">
                 <a:effectLst/>
                 <a:latin typeface="-apple-system"/>
               </a:rPr>
@@ -12495,7 +10383,7 @@
               <a:buChar char="•"/>
             </a:pPr>
             <a:r>
-              <a:rPr lang="en-US" sz="1800" b="0" i="0">
+              <a:rPr lang="en-US" sz="1800" b="0" i="0" dirty="0">
                 <a:effectLst/>
                 <a:latin typeface="-apple-system"/>
               </a:rPr>
@@ -12506,7 +10394,7 @@
             <a:pPr marL="0" indent="0">
               <a:buNone/>
             </a:pPr>
-            <a:endParaRPr lang="en-US" sz="1800"/>
+            <a:endParaRPr lang="en-US" sz="1800" dirty="0"/>
           </a:p>
         </p:txBody>
       </p:sp>

</xml_diff>